<commit_message>
maschine learning teil hinzugefügt
</commit_message>
<xml_diff>
--- a/Wöchentliche Treffen/2018-05-17.pptx
+++ b/Wöchentliche Treffen/2018-05-17.pptx
@@ -5,7 +5,7 @@
     <p:sldMasterId id="2147483659" r:id="rId1"/>
   </p:sldMasterIdLst>
   <p:notesMasterIdLst>
-    <p:notesMasterId r:id="rId24"/>
+    <p:notesMasterId r:id="rId28"/>
   </p:notesMasterIdLst>
   <p:sldIdLst>
     <p:sldId id="257" r:id="rId2"/>
@@ -28,8 +28,12 @@
     <p:sldId id="289" r:id="rId19"/>
     <p:sldId id="290" r:id="rId20"/>
     <p:sldId id="297" r:id="rId21"/>
-    <p:sldId id="296" r:id="rId22"/>
-    <p:sldId id="269" r:id="rId23"/>
+    <p:sldId id="299" r:id="rId22"/>
+    <p:sldId id="300" r:id="rId23"/>
+    <p:sldId id="302" r:id="rId24"/>
+    <p:sldId id="298" r:id="rId25"/>
+    <p:sldId id="296" r:id="rId26"/>
+    <p:sldId id="269" r:id="rId27"/>
   </p:sldIdLst>
   <p:sldSz cx="12192000" cy="6858000"/>
   <p:notesSz cx="7099300" cy="10234613"/>
@@ -264,7 +268,18 @@
   </p:defaultTextStyle>
   <p:extLst>
     <p:ext uri="{EFAFB233-063F-42B5-8137-9DF3F51BA10A}">
-      <p15:sldGuideLst xmlns="" xmlns:p15="http://schemas.microsoft.com/office/powerpoint/2012/main"/>
+      <p15:sldGuideLst xmlns:p15="http://schemas.microsoft.com/office/powerpoint/2012/main">
+        <p15:guide id="1" orient="horz" pos="2160">
+          <p15:clr>
+            <a:srgbClr val="A4A3A4"/>
+          </p15:clr>
+        </p15:guide>
+        <p15:guide id="2" pos="3840">
+          <p15:clr>
+            <a:srgbClr val="A4A3A4"/>
+          </p15:clr>
+        </p15:guide>
+      </p15:sldGuideLst>
     </p:ext>
   </p:extLst>
 </p:presentation>
@@ -1232,7 +1247,7 @@
     </p:spTree>
     <p:extLst>
       <p:ext uri="{BB962C8B-B14F-4D97-AF65-F5344CB8AC3E}">
-        <p14:creationId xmlns="" xmlns:p14="http://schemas.microsoft.com/office/powerpoint/2010/main" val="1680037075"/>
+        <p14:creationId xmlns:p14="http://schemas.microsoft.com/office/powerpoint/2010/main" val="1680037075"/>
       </p:ext>
     </p:extLst>
   </p:cSld>
@@ -1572,7 +1587,7 @@
     </p:spTree>
     <p:extLst>
       <p:ext uri="{BB962C8B-B14F-4D97-AF65-F5344CB8AC3E}">
-        <p14:creationId xmlns="" xmlns:p14="http://schemas.microsoft.com/office/powerpoint/2010/main" val="650078062"/>
+        <p14:creationId xmlns:p14="http://schemas.microsoft.com/office/powerpoint/2010/main" val="650078062"/>
       </p:ext>
     </p:extLst>
   </p:cSld>
@@ -1785,7 +1800,7 @@
     </p:spTree>
     <p:extLst>
       <p:ext uri="{BB962C8B-B14F-4D97-AF65-F5344CB8AC3E}">
-        <p14:creationId xmlns="" xmlns:p14="http://schemas.microsoft.com/office/powerpoint/2010/main" val="330525598"/>
+        <p14:creationId xmlns:p14="http://schemas.microsoft.com/office/powerpoint/2010/main" val="330525598"/>
       </p:ext>
     </p:extLst>
   </p:cSld>
@@ -1998,7 +2013,7 @@
     </p:spTree>
     <p:extLst>
       <p:ext uri="{BB962C8B-B14F-4D97-AF65-F5344CB8AC3E}">
-        <p14:creationId xmlns="" xmlns:p14="http://schemas.microsoft.com/office/powerpoint/2010/main" val="330525598"/>
+        <p14:creationId xmlns:p14="http://schemas.microsoft.com/office/powerpoint/2010/main" val="330525598"/>
       </p:ext>
     </p:extLst>
   </p:cSld>
@@ -2211,7 +2226,7 @@
     </p:spTree>
     <p:extLst>
       <p:ext uri="{BB962C8B-B14F-4D97-AF65-F5344CB8AC3E}">
-        <p14:creationId xmlns="" xmlns:p14="http://schemas.microsoft.com/office/powerpoint/2010/main" val="330525598"/>
+        <p14:creationId xmlns:p14="http://schemas.microsoft.com/office/powerpoint/2010/main" val="330525598"/>
       </p:ext>
     </p:extLst>
   </p:cSld>
@@ -2417,7 +2432,7 @@
     </p:spTree>
     <p:extLst>
       <p:ext uri="{BB962C8B-B14F-4D97-AF65-F5344CB8AC3E}">
-        <p14:creationId xmlns:p14="http://schemas.microsoft.com/office/powerpoint/2010/main" xmlns="" val="3733362650"/>
+        <p14:creationId xmlns:p14="http://schemas.microsoft.com/office/powerpoint/2010/main" val="3733362650"/>
       </p:ext>
     </p:extLst>
   </p:cSld>
@@ -2556,7 +2571,7 @@
     </p:spTree>
     <p:extLst>
       <p:ext uri="{BB962C8B-B14F-4D97-AF65-F5344CB8AC3E}">
-        <p14:creationId xmlns:p14="http://schemas.microsoft.com/office/powerpoint/2010/main" xmlns="" val="4250423630"/>
+        <p14:creationId xmlns:p14="http://schemas.microsoft.com/office/powerpoint/2010/main" val="4250423630"/>
       </p:ext>
     </p:extLst>
   </p:cSld>
@@ -2696,6 +2711,11 @@
         </p:txBody>
       </p:sp>
     </p:spTree>
+    <p:extLst>
+      <p:ext uri="{BB962C8B-B14F-4D97-AF65-F5344CB8AC3E}">
+        <p14:creationId xmlns:p14="http://schemas.microsoft.com/office/powerpoint/2010/main" val="2141409352"/>
+      </p:ext>
+    </p:extLst>
   </p:cSld>
   <p:clrMapOvr>
     <a:masterClrMapping/>
@@ -2806,7 +2826,7 @@
     </p:spTree>
     <p:extLst>
       <p:ext uri="{BB962C8B-B14F-4D97-AF65-F5344CB8AC3E}">
-        <p14:creationId xmlns="" xmlns:p14="http://schemas.microsoft.com/office/powerpoint/2010/main" val="1779252579"/>
+        <p14:creationId xmlns:p14="http://schemas.microsoft.com/office/powerpoint/2010/main" val="1779252579"/>
       </p:ext>
     </p:extLst>
   </p:cSld>
@@ -4950,7 +4970,7 @@
     </p:spTree>
     <p:extLst>
       <p:ext uri="{BB962C8B-B14F-4D97-AF65-F5344CB8AC3E}">
-        <p14:creationId xmlns:p14="http://schemas.microsoft.com/office/powerpoint/2010/main" xmlns="" val="1904731353"/>
+        <p14:creationId xmlns:p14="http://schemas.microsoft.com/office/powerpoint/2010/main" val="1904731353"/>
       </p:ext>
     </p:extLst>
   </p:cSld>
@@ -5152,7 +5172,7 @@
     </p:spTree>
     <p:extLst>
       <p:ext uri="{BB962C8B-B14F-4D97-AF65-F5344CB8AC3E}">
-        <p14:creationId xmlns:p14="http://schemas.microsoft.com/office/powerpoint/2010/main" xmlns="" val="1904731353"/>
+        <p14:creationId xmlns:p14="http://schemas.microsoft.com/office/powerpoint/2010/main" val="1904731353"/>
       </p:ext>
     </p:extLst>
   </p:cSld>
@@ -5354,7 +5374,7 @@
     </p:spTree>
     <p:extLst>
       <p:ext uri="{BB962C8B-B14F-4D97-AF65-F5344CB8AC3E}">
-        <p14:creationId xmlns:p14="http://schemas.microsoft.com/office/powerpoint/2010/main" xmlns="" val="1904731353"/>
+        <p14:creationId xmlns:p14="http://schemas.microsoft.com/office/powerpoint/2010/main" val="1904731353"/>
       </p:ext>
     </p:extLst>
   </p:cSld>
@@ -5556,7 +5576,7 @@
     </p:spTree>
     <p:extLst>
       <p:ext uri="{BB962C8B-B14F-4D97-AF65-F5344CB8AC3E}">
-        <p14:creationId xmlns:p14="http://schemas.microsoft.com/office/powerpoint/2010/main" xmlns="" val="1904731353"/>
+        <p14:creationId xmlns:p14="http://schemas.microsoft.com/office/powerpoint/2010/main" val="1904731353"/>
       </p:ext>
     </p:extLst>
   </p:cSld>
@@ -6793,7 +6813,7 @@
           <a:blip r:embed="rId3" cstate="email">
             <a:extLst>
               <a:ext uri="{28A0092B-C50C-407E-A947-70E740481C1C}">
-                <a14:useLocalDpi xmlns="" xmlns:a14="http://schemas.microsoft.com/office/drawing/2010/main" val="0"/>
+                <a14:useLocalDpi xmlns:a14="http://schemas.microsoft.com/office/drawing/2010/main" val="0"/>
               </a:ext>
             </a:extLst>
           </a:blip>
@@ -6993,12 +7013,34 @@
               <a:buAutoNum type="arabicParenBoth"/>
             </a:pPr>
             <a:r>
+              <a:rPr lang="de-DE" sz="2000" b="1" dirty="0">
+                <a:solidFill>
+                  <a:schemeClr val="tx1"/>
+                </a:solidFill>
+              </a:rPr>
+              <a:t>Maschine Learning &amp; Pattern Recognition</a:t>
+            </a:r>
+          </a:p>
+          <a:p>
+            <a:pPr marL="571500" indent="-457200">
+              <a:buFont typeface="+mj-lt"/>
+              <a:buAutoNum type="arabicParenBoth"/>
+            </a:pPr>
+            <a:r>
               <a:rPr lang="de-DE" sz="2000" b="1" dirty="0" smtClean="0">
                 <a:solidFill>
                   <a:schemeClr val="tx1"/>
                 </a:solidFill>
               </a:rPr>
-              <a:t>Nächste Schritte</a:t>
+              <a:t>Nächste </a:t>
+            </a:r>
+            <a:r>
+              <a:rPr lang="de-DE" sz="2000" b="1" dirty="0" smtClean="0">
+                <a:solidFill>
+                  <a:schemeClr val="tx1"/>
+                </a:solidFill>
+              </a:rPr>
+              <a:t>Schritte</a:t>
             </a:r>
           </a:p>
           <a:p>
@@ -7048,6 +7090,13 @@
   <p:clrMapOvr>
     <a:masterClrMapping/>
   </p:clrMapOvr>
+  <p:timing>
+    <p:tnLst>
+      <p:par>
+        <p:cTn id="1" dur="indefinite" restart="never" nodeType="tmRoot"/>
+      </p:par>
+    </p:tnLst>
+  </p:timing>
 </p:sld>
 </file>
 
@@ -7524,7 +7573,7 @@
     </p:spTree>
     <p:extLst>
       <p:ext uri="{BB962C8B-B14F-4D97-AF65-F5344CB8AC3E}">
-        <p14:creationId xmlns="" xmlns:p14="http://schemas.microsoft.com/office/powerpoint/2010/main" val="4006514606"/>
+        <p14:creationId xmlns:p14="http://schemas.microsoft.com/office/powerpoint/2010/main" val="4006514606"/>
       </p:ext>
     </p:extLst>
   </p:cSld>
@@ -8036,7 +8085,7 @@
     </p:spTree>
     <p:extLst>
       <p:ext uri="{BB962C8B-B14F-4D97-AF65-F5344CB8AC3E}">
-        <p14:creationId xmlns:p14="http://schemas.microsoft.com/office/powerpoint/2010/main" xmlns="" val="308870254"/>
+        <p14:creationId xmlns:p14="http://schemas.microsoft.com/office/powerpoint/2010/main" val="308870254"/>
       </p:ext>
     </p:extLst>
   </p:cSld>
@@ -8646,7 +8695,7 @@
     </p:spTree>
     <p:extLst>
       <p:ext uri="{BB962C8B-B14F-4D97-AF65-F5344CB8AC3E}">
-        <p14:creationId xmlns:p14="http://schemas.microsoft.com/office/powerpoint/2010/main" xmlns="" val="3514973820"/>
+        <p14:creationId xmlns:p14="http://schemas.microsoft.com/office/powerpoint/2010/main" val="3514973820"/>
       </p:ext>
     </p:extLst>
   </p:cSld>
@@ -9660,7 +9709,7 @@
           <a:blip r:embed="rId2" cstate="email">
             <a:extLst>
               <a:ext uri="{28A0092B-C50C-407E-A947-70E740481C1C}">
-                <a14:useLocalDpi xmlns:a14="http://schemas.microsoft.com/office/drawing/2010/main" xmlns="" val="0"/>
+                <a14:useLocalDpi xmlns:a14="http://schemas.microsoft.com/office/drawing/2010/main" val="0"/>
               </a:ext>
             </a:extLst>
           </a:blip>
@@ -9828,7 +9877,7 @@
     </p:spTree>
     <p:extLst>
       <p:ext uri="{BB962C8B-B14F-4D97-AF65-F5344CB8AC3E}">
-        <p14:creationId xmlns:p14="http://schemas.microsoft.com/office/powerpoint/2010/main" xmlns="" val="3008181596"/>
+        <p14:creationId xmlns:p14="http://schemas.microsoft.com/office/powerpoint/2010/main" val="3008181596"/>
       </p:ext>
     </p:extLst>
   </p:cSld>
@@ -10157,12 +10206,34 @@
               <a:buAutoNum type="arabicParenBoth"/>
             </a:pPr>
             <a:r>
+              <a:rPr lang="de-DE" sz="2000" b="1" dirty="0">
+                <a:solidFill>
+                  <a:schemeClr val="tx1"/>
+                </a:solidFill>
+              </a:rPr>
+              <a:t>Maschine Learning &amp; Pattern Recognition</a:t>
+            </a:r>
+          </a:p>
+          <a:p>
+            <a:pPr marL="571500" indent="-457200">
+              <a:buFont typeface="+mj-lt"/>
+              <a:buAutoNum type="arabicParenBoth"/>
+            </a:pPr>
+            <a:r>
               <a:rPr lang="de-DE" sz="2000" b="1" dirty="0" smtClean="0">
                 <a:solidFill>
                   <a:schemeClr val="tx1"/>
                 </a:solidFill>
               </a:rPr>
-              <a:t>Nächste Schritte</a:t>
+              <a:t>Nächste </a:t>
+            </a:r>
+            <a:r>
+              <a:rPr lang="de-DE" sz="2000" b="1" dirty="0" smtClean="0">
+                <a:solidFill>
+                  <a:schemeClr val="tx1"/>
+                </a:solidFill>
+              </a:rPr>
+              <a:t>Schritte</a:t>
             </a:r>
           </a:p>
           <a:p>
@@ -10212,6 +10283,13 @@
   <p:clrMapOvr>
     <a:masterClrMapping/>
   </p:clrMapOvr>
+  <p:timing>
+    <p:tnLst>
+      <p:par>
+        <p:cTn id="1" dur="indefinite" restart="never" nodeType="tmRoot"/>
+      </p:par>
+    </p:tnLst>
+  </p:timing>
 </p:sld>
 </file>
 
@@ -10415,18 +10493,21 @@
                   </a:schemeClr>
                 </a:solidFill>
               </a:rPr>
-              <a:t> I^2C Bus und </a:t>
+              <a:t> I^2C Bus und Multiplexer</a:t>
             </a:r>
+          </a:p>
+          <a:p>
+            <a:pPr marL="571500" indent="-457200">
+              <a:buFont typeface="+mj-lt"/>
+              <a:buAutoNum type="arabicParenBoth"/>
+            </a:pPr>
             <a:r>
-              <a:rPr lang="de-DE" sz="2000" b="1" dirty="0" smtClean="0">
+              <a:rPr lang="de-DE" sz="2000" b="1" dirty="0">
                 <a:solidFill>
-                  <a:schemeClr val="accent6">
-                    <a:lumMod val="60000"/>
-                    <a:lumOff val="40000"/>
-                  </a:schemeClr>
+                  <a:schemeClr val="tx1"/>
                 </a:solidFill>
               </a:rPr>
-              <a:t>Multiplexer</a:t>
+              <a:t>Maschine Learning &amp; Pattern Recognition</a:t>
             </a:r>
           </a:p>
           <a:p>
@@ -10440,7 +10521,15 @@
                   <a:schemeClr val="tx1"/>
                 </a:solidFill>
               </a:rPr>
-              <a:t>Nächste Schritte</a:t>
+              <a:t>Nächste </a:t>
+            </a:r>
+            <a:r>
+              <a:rPr lang="de-DE" sz="2000" b="1" dirty="0" smtClean="0">
+                <a:solidFill>
+                  <a:schemeClr val="tx1"/>
+                </a:solidFill>
+              </a:rPr>
+              <a:t>Schritte</a:t>
             </a:r>
           </a:p>
           <a:p>
@@ -10493,6 +10582,13 @@
   <p:clrMapOvr>
     <a:masterClrMapping/>
   </p:clrMapOvr>
+  <p:timing>
+    <p:tnLst>
+      <p:par>
+        <p:cTn id="1" dur="indefinite" restart="never" nodeType="tmRoot"/>
+      </p:par>
+    </p:tnLst>
+  </p:timing>
 </p:sld>
 </file>
 
@@ -10687,6 +10783,13 @@
   <p:clrMapOvr>
     <a:masterClrMapping/>
   </p:clrMapOvr>
+  <p:timing>
+    <p:tnLst>
+      <p:par>
+        <p:cTn id="1" dur="indefinite" restart="never" nodeType="tmRoot"/>
+      </p:par>
+    </p:tnLst>
+  </p:timing>
 </p:sld>
 </file>
 
@@ -10885,6 +10988,13 @@
   <p:clrMapOvr>
     <a:masterClrMapping/>
   </p:clrMapOvr>
+  <p:timing>
+    <p:tnLst>
+      <p:par>
+        <p:cTn id="1" dur="indefinite" restart="never" nodeType="tmRoot"/>
+      </p:par>
+    </p:tnLst>
+  </p:timing>
 </p:sld>
 </file>
 
@@ -11010,6 +11120,25 @@
                   <a:schemeClr val="tx1"/>
                 </a:solidFill>
               </a:rPr>
+              <a:t>Maschine Learning &amp; Pattern Recognition</a:t>
+            </a:r>
+            <a:endParaRPr lang="de-DE" sz="2000" b="1" dirty="0" smtClean="0">
+              <a:solidFill>
+                <a:schemeClr val="tx1"/>
+              </a:solidFill>
+            </a:endParaRPr>
+          </a:p>
+          <a:p>
+            <a:pPr marL="571500" indent="-457200">
+              <a:buFont typeface="+mj-lt"/>
+              <a:buAutoNum type="arabicParenBoth"/>
+            </a:pPr>
+            <a:r>
+              <a:rPr lang="de-DE" sz="2000" b="1" dirty="0" smtClean="0">
+                <a:solidFill>
+                  <a:schemeClr val="tx1"/>
+                </a:solidFill>
+              </a:rPr>
               <a:t>Nächste Schritte</a:t>
             </a:r>
           </a:p>
@@ -11053,6 +11182,13 @@
   <p:clrMapOvr>
     <a:masterClrMapping/>
   </p:clrMapOvr>
+  <p:timing>
+    <p:tnLst>
+      <p:par>
+        <p:cTn id="1" dur="indefinite" restart="never" nodeType="tmRoot"/>
+      </p:par>
+    </p:tnLst>
+  </p:timing>
 </p:sld>
 </file>
 
@@ -11181,24 +11317,35 @@
               <a:buAutoNum type="arabicParenBoth"/>
             </a:pPr>
             <a:r>
+              <a:rPr lang="de-DE" sz="2000" b="1" dirty="0">
+                <a:solidFill>
+                  <a:srgbClr val="FF0000"/>
+                </a:solidFill>
+              </a:rPr>
+              <a:t>Maschine Learning &amp; Pattern Recognition</a:t>
+            </a:r>
+          </a:p>
+          <a:p>
+            <a:pPr marL="571500" indent="-457200">
+              <a:buFont typeface="+mj-lt"/>
+              <a:buAutoNum type="arabicParenBoth"/>
+            </a:pPr>
+            <a:r>
               <a:rPr lang="de-DE" sz="2000" b="1" dirty="0" smtClean="0">
                 <a:solidFill>
-                  <a:schemeClr val="accent6">
-                    <a:lumMod val="60000"/>
-                    <a:lumOff val="40000"/>
-                  </a:schemeClr>
+                  <a:schemeClr val="tx1"/>
                 </a:solidFill>
               </a:rPr>
-              <a:t>Nächste Schritte</a:t>
+              <a:t>Nächste </a:t>
             </a:r>
-            <a:endParaRPr lang="de-DE" sz="2000" b="1" dirty="0" smtClean="0">
-              <a:solidFill>
-                <a:schemeClr val="accent6">
-                  <a:lumMod val="60000"/>
-                  <a:lumOff val="40000"/>
-                </a:schemeClr>
-              </a:solidFill>
-            </a:endParaRPr>
+            <a:r>
+              <a:rPr lang="de-DE" sz="2000" b="1" dirty="0" smtClean="0">
+                <a:solidFill>
+                  <a:schemeClr val="tx1"/>
+                </a:solidFill>
+              </a:rPr>
+              <a:t>Schritte</a:t>
+            </a:r>
           </a:p>
           <a:p>
             <a:pPr>
@@ -11236,10 +11383,3500 @@
   <p:clrMapOvr>
     <a:masterClrMapping/>
   </p:clrMapOvr>
+  <p:timing>
+    <p:tnLst>
+      <p:par>
+        <p:cTn id="1" dur="indefinite" restart="never" nodeType="tmRoot"/>
+      </p:par>
+    </p:tnLst>
+  </p:timing>
 </p:sld>
 </file>
 
 <file path=ppt/slides/slide21.xml><?xml version="1.0" encoding="utf-8"?>
+<p:sld xmlns:a="http://schemas.openxmlformats.org/drawingml/2006/main" xmlns:r="http://schemas.openxmlformats.org/officeDocument/2006/relationships" xmlns:p="http://schemas.openxmlformats.org/presentationml/2006/main">
+  <p:cSld>
+    <p:spTree>
+      <p:nvGrpSpPr>
+        <p:cNvPr id="1" name=""/>
+        <p:cNvGrpSpPr/>
+        <p:nvPr/>
+      </p:nvGrpSpPr>
+      <p:grpSpPr>
+        <a:xfrm>
+          <a:off x="0" y="0"/>
+          <a:ext cx="0" cy="0"/>
+          <a:chOff x="0" y="0"/>
+          <a:chExt cx="0" cy="0"/>
+        </a:xfrm>
+      </p:grpSpPr>
+      <mc:AlternateContent xmlns:mc="http://schemas.openxmlformats.org/markup-compatibility/2006">
+        <mc:Choice xmlns:a14="http://schemas.microsoft.com/office/drawing/2010/main" Requires="a14">
+          <p:sp>
+            <p:nvSpPr>
+              <p:cNvPr id="2" name="Textplatzhalter 1"/>
+              <p:cNvSpPr>
+                <a:spLocks noGrp="1"/>
+              </p:cNvSpPr>
+              <p:nvPr>
+                <p:ph type="body" idx="1"/>
+              </p:nvPr>
+            </p:nvSpPr>
+            <p:spPr>
+              <a:xfrm>
+                <a:off x="373038" y="1052053"/>
+                <a:ext cx="11484000" cy="4778476"/>
+              </a:xfrm>
+            </p:spPr>
+            <p:txBody>
+              <a:bodyPr/>
+              <a:lstStyle/>
+              <a:p>
+                <a:r>
+                  <a:rPr lang="de-DE" b="1" dirty="0" smtClean="0"/>
+                  <a:t>Gegeben</a:t>
+                </a:r>
+                <a:r>
+                  <a:rPr lang="de-DE" dirty="0" smtClean="0"/>
+                  <a:t>:</a:t>
+                </a:r>
+              </a:p>
+              <a:p>
+                <a:pPr lvl="1"/>
+                <a:r>
+                  <a:rPr lang="de-DE" dirty="0" smtClean="0"/>
+                  <a:t>Eine Menge von Daten </a:t>
+                </a:r>
+                <a14:m>
+                  <m:oMath xmlns:m="http://schemas.openxmlformats.org/officeDocument/2006/math">
+                    <m:d>
+                      <m:dPr>
+                        <m:ctrlPr>
+                          <a:rPr lang="de-DE" b="0" i="0" smtClean="0">
+                            <a:latin typeface="Cambria Math" panose="02040503050406030204" pitchFamily="18" charset="0"/>
+                          </a:rPr>
+                        </m:ctrlPr>
+                      </m:dPr>
+                      <m:e>
+                        <m:r>
+                          <a:rPr lang="de-DE" b="1" i="1">
+                            <a:latin typeface="Cambria Math" panose="02040503050406030204" pitchFamily="18" charset="0"/>
+                          </a:rPr>
+                          <m:t>𝑿</m:t>
+                        </m:r>
+                        <m:r>
+                          <a:rPr lang="de-DE" b="1" i="1" smtClean="0">
+                            <a:latin typeface="Cambria Math" panose="02040503050406030204" pitchFamily="18" charset="0"/>
+                          </a:rPr>
+                          <m:t>,</m:t>
+                        </m:r>
+                        <m:r>
+                          <a:rPr lang="de-DE" b="1" i="1" smtClean="0">
+                            <a:latin typeface="Cambria Math" panose="02040503050406030204" pitchFamily="18" charset="0"/>
+                          </a:rPr>
+                          <m:t>𝑻</m:t>
+                        </m:r>
+                      </m:e>
+                    </m:d>
+                    <m:r>
+                      <a:rPr lang="de-DE" b="1" i="1" smtClean="0">
+                        <a:latin typeface="Cambria Math" panose="02040503050406030204" pitchFamily="18" charset="0"/>
+                      </a:rPr>
+                      <m:t>≔</m:t>
+                    </m:r>
+                    <m:d>
+                      <m:dPr>
+                        <m:begChr m:val="{"/>
+                        <m:endChr m:val="}"/>
+                        <m:ctrlPr>
+                          <a:rPr lang="de-DE" b="1" i="1" smtClean="0">
+                            <a:latin typeface="Cambria Math" panose="02040503050406030204" pitchFamily="18" charset="0"/>
+                          </a:rPr>
+                        </m:ctrlPr>
+                      </m:dPr>
+                      <m:e>
+                        <m:d>
+                          <m:dPr>
+                            <m:ctrlPr>
+                              <a:rPr lang="de-DE" b="1" i="1" smtClean="0">
+                                <a:latin typeface="Cambria Math" panose="02040503050406030204" pitchFamily="18" charset="0"/>
+                              </a:rPr>
+                            </m:ctrlPr>
+                          </m:dPr>
+                          <m:e>
+                            <m:sSub>
+                              <m:sSubPr>
+                                <m:ctrlPr>
+                                  <a:rPr lang="de-DE" b="1" i="1" smtClean="0">
+                                    <a:latin typeface="Cambria Math" panose="02040503050406030204" pitchFamily="18" charset="0"/>
+                                  </a:rPr>
+                                </m:ctrlPr>
+                              </m:sSubPr>
+                              <m:e>
+                                <m:r>
+                                  <a:rPr lang="de-DE" b="1" i="1" smtClean="0">
+                                    <a:latin typeface="Cambria Math" panose="02040503050406030204" pitchFamily="18" charset="0"/>
+                                  </a:rPr>
+                                  <m:t>𝒙</m:t>
+                                </m:r>
+                              </m:e>
+                              <m:sub>
+                                <m:r>
+                                  <a:rPr lang="de-DE" b="1" i="1" smtClean="0">
+                                    <a:latin typeface="Cambria Math" panose="02040503050406030204" pitchFamily="18" charset="0"/>
+                                  </a:rPr>
+                                  <m:t>𝟏</m:t>
+                                </m:r>
+                              </m:sub>
+                            </m:sSub>
+                            <m:r>
+                              <a:rPr lang="de-DE" b="1" i="1" smtClean="0">
+                                <a:latin typeface="Cambria Math" panose="02040503050406030204" pitchFamily="18" charset="0"/>
+                              </a:rPr>
+                              <m:t>,</m:t>
+                            </m:r>
+                            <m:sSub>
+                              <m:sSubPr>
+                                <m:ctrlPr>
+                                  <a:rPr lang="de-DE" b="1" i="1" smtClean="0">
+                                    <a:latin typeface="Cambria Math" panose="02040503050406030204" pitchFamily="18" charset="0"/>
+                                  </a:rPr>
+                                </m:ctrlPr>
+                              </m:sSubPr>
+                              <m:e>
+                                <m:r>
+                                  <a:rPr lang="de-DE" b="1" i="1" smtClean="0">
+                                    <a:latin typeface="Cambria Math" panose="02040503050406030204" pitchFamily="18" charset="0"/>
+                                  </a:rPr>
+                                  <m:t>𝒕</m:t>
+                                </m:r>
+                              </m:e>
+                              <m:sub>
+                                <m:r>
+                                  <a:rPr lang="de-DE" b="1" i="1" smtClean="0">
+                                    <a:latin typeface="Cambria Math" panose="02040503050406030204" pitchFamily="18" charset="0"/>
+                                  </a:rPr>
+                                  <m:t>𝟏</m:t>
+                                </m:r>
+                              </m:sub>
+                            </m:sSub>
+                          </m:e>
+                        </m:d>
+                        <m:r>
+                          <a:rPr lang="de-DE" b="1" i="1" smtClean="0">
+                            <a:latin typeface="Cambria Math" panose="02040503050406030204" pitchFamily="18" charset="0"/>
+                          </a:rPr>
+                          <m:t>,…,</m:t>
+                        </m:r>
+                        <m:d>
+                          <m:dPr>
+                            <m:ctrlPr>
+                              <a:rPr lang="de-DE" b="1" i="1" smtClean="0">
+                                <a:latin typeface="Cambria Math" panose="02040503050406030204" pitchFamily="18" charset="0"/>
+                              </a:rPr>
+                            </m:ctrlPr>
+                          </m:dPr>
+                          <m:e>
+                            <m:sSub>
+                              <m:sSubPr>
+                                <m:ctrlPr>
+                                  <a:rPr lang="de-DE" b="1" i="1" smtClean="0">
+                                    <a:latin typeface="Cambria Math" panose="02040503050406030204" pitchFamily="18" charset="0"/>
+                                  </a:rPr>
+                                </m:ctrlPr>
+                              </m:sSubPr>
+                              <m:e>
+                                <m:r>
+                                  <a:rPr lang="de-DE" b="1" i="1" smtClean="0">
+                                    <a:latin typeface="Cambria Math" panose="02040503050406030204" pitchFamily="18" charset="0"/>
+                                  </a:rPr>
+                                  <m:t>𝒙</m:t>
+                                </m:r>
+                              </m:e>
+                              <m:sub>
+                                <m:r>
+                                  <a:rPr lang="de-DE" b="1" i="1" smtClean="0">
+                                    <a:latin typeface="Cambria Math" panose="02040503050406030204" pitchFamily="18" charset="0"/>
+                                  </a:rPr>
+                                  <m:t>𝑵</m:t>
+                                </m:r>
+                              </m:sub>
+                            </m:sSub>
+                            <m:r>
+                              <a:rPr lang="de-DE" b="1" i="1" smtClean="0">
+                                <a:latin typeface="Cambria Math" panose="02040503050406030204" pitchFamily="18" charset="0"/>
+                              </a:rPr>
+                              <m:t>,</m:t>
+                            </m:r>
+                            <m:sSub>
+                              <m:sSubPr>
+                                <m:ctrlPr>
+                                  <a:rPr lang="de-DE" b="1" i="1" smtClean="0">
+                                    <a:latin typeface="Cambria Math" panose="02040503050406030204" pitchFamily="18" charset="0"/>
+                                  </a:rPr>
+                                </m:ctrlPr>
+                              </m:sSubPr>
+                              <m:e>
+                                <m:r>
+                                  <a:rPr lang="de-DE" b="1" i="1" smtClean="0">
+                                    <a:latin typeface="Cambria Math" panose="02040503050406030204" pitchFamily="18" charset="0"/>
+                                  </a:rPr>
+                                  <m:t>𝒕</m:t>
+                                </m:r>
+                              </m:e>
+                              <m:sub>
+                                <m:r>
+                                  <a:rPr lang="de-DE" b="1" i="1" smtClean="0">
+                                    <a:latin typeface="Cambria Math" panose="02040503050406030204" pitchFamily="18" charset="0"/>
+                                  </a:rPr>
+                                  <m:t>𝑵</m:t>
+                                </m:r>
+                              </m:sub>
+                            </m:sSub>
+                          </m:e>
+                        </m:d>
+                      </m:e>
+                    </m:d>
+                  </m:oMath>
+                </a14:m>
+                <a:r>
+                  <a:rPr lang="de-DE" dirty="0" smtClean="0"/>
+                  <a:t> bestehend aus Eingängen </a:t>
+                </a:r>
+                <a14:m>
+                  <m:oMath xmlns:m="http://schemas.openxmlformats.org/officeDocument/2006/math">
+                    <m:r>
+                      <a:rPr lang="de-DE" b="1" i="1" smtClean="0">
+                        <a:latin typeface="Cambria Math" panose="02040503050406030204" pitchFamily="18" charset="0"/>
+                      </a:rPr>
+                      <m:t>𝑿</m:t>
+                    </m:r>
+                    <m:r>
+                      <a:rPr lang="de-DE" b="0" i="1" smtClean="0">
+                        <a:latin typeface="Cambria Math" panose="02040503050406030204" pitchFamily="18" charset="0"/>
+                      </a:rPr>
+                      <m:t>={</m:t>
+                    </m:r>
+                    <m:sSub>
+                      <m:sSubPr>
+                        <m:ctrlPr>
+                          <a:rPr lang="de-DE" b="1" i="1" smtClean="0">
+                            <a:latin typeface="Cambria Math" panose="02040503050406030204" pitchFamily="18" charset="0"/>
+                          </a:rPr>
+                        </m:ctrlPr>
+                      </m:sSubPr>
+                      <m:e>
+                        <m:r>
+                          <a:rPr lang="de-DE" b="1" i="1" smtClean="0">
+                            <a:latin typeface="Cambria Math" panose="02040503050406030204" pitchFamily="18" charset="0"/>
+                          </a:rPr>
+                          <m:t>𝒙</m:t>
+                        </m:r>
+                      </m:e>
+                      <m:sub>
+                        <m:r>
+                          <a:rPr lang="de-DE" b="1" i="1" smtClean="0">
+                            <a:latin typeface="Cambria Math" panose="02040503050406030204" pitchFamily="18" charset="0"/>
+                          </a:rPr>
+                          <m:t>𝟏</m:t>
+                        </m:r>
+                      </m:sub>
+                    </m:sSub>
+                    <m:r>
+                      <a:rPr lang="de-DE" b="0" i="1" smtClean="0">
+                        <a:latin typeface="Cambria Math" panose="02040503050406030204" pitchFamily="18" charset="0"/>
+                      </a:rPr>
+                      <m:t>,…,</m:t>
+                    </m:r>
+                    <m:sSub>
+                      <m:sSubPr>
+                        <m:ctrlPr>
+                          <a:rPr lang="de-DE" b="1" i="1" smtClean="0">
+                            <a:latin typeface="Cambria Math" panose="02040503050406030204" pitchFamily="18" charset="0"/>
+                          </a:rPr>
+                        </m:ctrlPr>
+                      </m:sSubPr>
+                      <m:e>
+                        <m:r>
+                          <a:rPr lang="de-DE" b="1" i="1" smtClean="0">
+                            <a:latin typeface="Cambria Math" panose="02040503050406030204" pitchFamily="18" charset="0"/>
+                          </a:rPr>
+                          <m:t>𝒙</m:t>
+                        </m:r>
+                      </m:e>
+                      <m:sub>
+                        <m:r>
+                          <a:rPr lang="de-DE" b="1" i="1" smtClean="0">
+                            <a:latin typeface="Cambria Math" panose="02040503050406030204" pitchFamily="18" charset="0"/>
+                          </a:rPr>
+                          <m:t>𝑵</m:t>
+                        </m:r>
+                      </m:sub>
+                    </m:sSub>
+                    <m:r>
+                      <a:rPr lang="de-DE" b="0" i="1" smtClean="0">
+                        <a:latin typeface="Cambria Math" panose="02040503050406030204" pitchFamily="18" charset="0"/>
+                      </a:rPr>
+                      <m:t>}</m:t>
+                    </m:r>
+                  </m:oMath>
+                </a14:m>
+                <a:r>
+                  <a:rPr lang="de-DE" dirty="0" smtClean="0"/>
+                  <a:t> und Ausgängen </a:t>
+                </a:r>
+                <a14:m>
+                  <m:oMath xmlns:m="http://schemas.openxmlformats.org/officeDocument/2006/math">
+                    <m:r>
+                      <a:rPr lang="de-DE" b="1" i="1" smtClean="0">
+                        <a:latin typeface="Cambria Math" panose="02040503050406030204" pitchFamily="18" charset="0"/>
+                      </a:rPr>
+                      <m:t>𝑻</m:t>
+                    </m:r>
+                    <m:r>
+                      <a:rPr lang="de-DE" i="1">
+                        <a:latin typeface="Cambria Math" panose="02040503050406030204" pitchFamily="18" charset="0"/>
+                      </a:rPr>
+                      <m:t>={</m:t>
+                    </m:r>
+                    <m:sSub>
+                      <m:sSubPr>
+                        <m:ctrlPr>
+                          <a:rPr lang="de-DE" b="1" i="1">
+                            <a:latin typeface="Cambria Math" panose="02040503050406030204" pitchFamily="18" charset="0"/>
+                          </a:rPr>
+                        </m:ctrlPr>
+                      </m:sSubPr>
+                      <m:e>
+                        <m:r>
+                          <a:rPr lang="de-DE" b="1" i="1" smtClean="0">
+                            <a:latin typeface="Cambria Math" panose="02040503050406030204" pitchFamily="18" charset="0"/>
+                          </a:rPr>
+                          <m:t>𝒕</m:t>
+                        </m:r>
+                      </m:e>
+                      <m:sub>
+                        <m:r>
+                          <a:rPr lang="de-DE" b="1" i="1">
+                            <a:latin typeface="Cambria Math" panose="02040503050406030204" pitchFamily="18" charset="0"/>
+                          </a:rPr>
+                          <m:t>𝟏</m:t>
+                        </m:r>
+                      </m:sub>
+                    </m:sSub>
+                    <m:r>
+                      <a:rPr lang="de-DE" i="1">
+                        <a:latin typeface="Cambria Math" panose="02040503050406030204" pitchFamily="18" charset="0"/>
+                      </a:rPr>
+                      <m:t>,…,</m:t>
+                    </m:r>
+                    <m:sSub>
+                      <m:sSubPr>
+                        <m:ctrlPr>
+                          <a:rPr lang="de-DE" b="1" i="1">
+                            <a:latin typeface="Cambria Math" panose="02040503050406030204" pitchFamily="18" charset="0"/>
+                          </a:rPr>
+                        </m:ctrlPr>
+                      </m:sSubPr>
+                      <m:e>
+                        <m:r>
+                          <a:rPr lang="de-DE" b="1" i="1" smtClean="0">
+                            <a:latin typeface="Cambria Math" panose="02040503050406030204" pitchFamily="18" charset="0"/>
+                          </a:rPr>
+                          <m:t>𝒕</m:t>
+                        </m:r>
+                      </m:e>
+                      <m:sub>
+                        <m:r>
+                          <a:rPr lang="de-DE" b="1" i="1" smtClean="0">
+                            <a:latin typeface="Cambria Math" panose="02040503050406030204" pitchFamily="18" charset="0"/>
+                          </a:rPr>
+                          <m:t>𝑵</m:t>
+                        </m:r>
+                      </m:sub>
+                    </m:sSub>
+                    <m:r>
+                      <a:rPr lang="de-DE" i="1">
+                        <a:latin typeface="Cambria Math" panose="02040503050406030204" pitchFamily="18" charset="0"/>
+                      </a:rPr>
+                      <m:t>}</m:t>
+                    </m:r>
+                  </m:oMath>
+                </a14:m>
+                <a:r>
+                  <a:rPr lang="de-DE" dirty="0"/>
+                  <a:t> </a:t>
+                </a:r>
+                <a:endParaRPr lang="de-DE" dirty="0" smtClean="0"/>
+              </a:p>
+              <a:p>
+                <a:endParaRPr lang="de-DE" dirty="0" smtClean="0"/>
+              </a:p>
+              <a:p>
+                <a:endParaRPr lang="de-DE" dirty="0"/>
+              </a:p>
+              <a:p>
+                <a:r>
+                  <a:rPr lang="de-DE" b="1" dirty="0"/>
+                  <a:t>Ziel</a:t>
+                </a:r>
+                <a:r>
+                  <a:rPr lang="de-DE" dirty="0"/>
+                  <a:t>: </a:t>
+                </a:r>
+                <a:endParaRPr lang="de-DE" dirty="0" smtClean="0"/>
+              </a:p>
+              <a:p>
+                <a:pPr lvl="1"/>
+                <a:r>
+                  <a:rPr lang="de-DE" dirty="0" smtClean="0"/>
+                  <a:t>Treffe basierend auf den gegebenen Daten eine Aussage über den Ausgang </a:t>
+                </a:r>
+                <a14:m>
+                  <m:oMath xmlns:m="http://schemas.openxmlformats.org/officeDocument/2006/math">
+                    <m:sSup>
+                      <m:sSupPr>
+                        <m:ctrlPr>
+                          <a:rPr lang="de-DE" b="1" i="1" smtClean="0">
+                            <a:latin typeface="Cambria Math" panose="02040503050406030204" pitchFamily="18" charset="0"/>
+                          </a:rPr>
+                        </m:ctrlPr>
+                      </m:sSupPr>
+                      <m:e>
+                        <m:r>
+                          <a:rPr lang="de-DE" b="1" i="1" smtClean="0">
+                            <a:latin typeface="Cambria Math" panose="02040503050406030204" pitchFamily="18" charset="0"/>
+                          </a:rPr>
+                          <m:t>𝒕</m:t>
+                        </m:r>
+                      </m:e>
+                      <m:sup>
+                        <m:r>
+                          <a:rPr lang="de-DE" b="1" i="1" smtClean="0">
+                            <a:latin typeface="Cambria Math" panose="02040503050406030204" pitchFamily="18" charset="0"/>
+                          </a:rPr>
+                          <m:t>∗</m:t>
+                        </m:r>
+                      </m:sup>
+                    </m:sSup>
+                  </m:oMath>
+                </a14:m>
+                <a:r>
+                  <a:rPr lang="de-DE" dirty="0" smtClean="0"/>
+                  <a:t> zu einer bisher unbekannten Eingangsgröße </a:t>
+                </a:r>
+                <a14:m>
+                  <m:oMath xmlns:m="http://schemas.openxmlformats.org/officeDocument/2006/math">
+                    <m:sSup>
+                      <m:sSupPr>
+                        <m:ctrlPr>
+                          <a:rPr lang="de-DE" b="1" i="1">
+                            <a:latin typeface="Cambria Math" panose="02040503050406030204" pitchFamily="18" charset="0"/>
+                          </a:rPr>
+                        </m:ctrlPr>
+                      </m:sSupPr>
+                      <m:e>
+                        <m:r>
+                          <a:rPr lang="de-DE" b="1" i="1" smtClean="0">
+                            <a:latin typeface="Cambria Math" panose="02040503050406030204" pitchFamily="18" charset="0"/>
+                          </a:rPr>
+                          <m:t>𝒙</m:t>
+                        </m:r>
+                      </m:e>
+                      <m:sup>
+                        <m:r>
+                          <a:rPr lang="de-DE" b="1" i="1">
+                            <a:latin typeface="Cambria Math" panose="02040503050406030204" pitchFamily="18" charset="0"/>
+                          </a:rPr>
+                          <m:t>∗</m:t>
+                        </m:r>
+                      </m:sup>
+                    </m:sSup>
+                  </m:oMath>
+                </a14:m>
+                <a:r>
+                  <a:rPr lang="de-DE" dirty="0" smtClean="0"/>
+                  <a:t> („Maschine Learning“)</a:t>
+                </a:r>
+                <a:endParaRPr lang="de-DE" dirty="0"/>
+              </a:p>
+              <a:p>
+                <a:pPr marL="127000" indent="0">
+                  <a:buNone/>
+                </a:pPr>
+                <a:endParaRPr lang="de-DE" dirty="0" smtClean="0"/>
+              </a:p>
+              <a:p>
+                <a:pPr marL="127000" indent="0">
+                  <a:buNone/>
+                </a:pPr>
+                <a:endParaRPr lang="de-DE" dirty="0" smtClean="0"/>
+              </a:p>
+              <a:p>
+                <a:pPr marL="127000" indent="0">
+                  <a:buNone/>
+                </a:pPr>
+                <a:endParaRPr lang="de-DE" dirty="0" smtClean="0"/>
+              </a:p>
+              <a:p>
+                <a:pPr marL="412750" indent="-285750"/>
+                <a:r>
+                  <a:rPr lang="de-DE" b="1" dirty="0" smtClean="0"/>
+                  <a:t>Beispiel</a:t>
+                </a:r>
+                <a:r>
+                  <a:rPr lang="de-DE" dirty="0" smtClean="0"/>
+                  <a:t>:</a:t>
+                </a:r>
+              </a:p>
+              <a:p>
+                <a:pPr marL="869950" lvl="1" indent="-285750"/>
+                <a:r>
+                  <a:rPr lang="de-DE" dirty="0" smtClean="0"/>
+                  <a:t>Gesucht ist eine (unbekannte) Funktion </a:t>
+                </a:r>
+                <a14:m>
+                  <m:oMath xmlns:m="http://schemas.openxmlformats.org/officeDocument/2006/math">
+                    <m:r>
+                      <a:rPr lang="de-DE" i="1">
+                        <a:latin typeface="Cambria Math" panose="02040503050406030204" pitchFamily="18" charset="0"/>
+                      </a:rPr>
+                      <m:t>𝑓</m:t>
+                    </m:r>
+                  </m:oMath>
+                </a14:m>
+                <a:r>
+                  <a:rPr lang="de-DE" dirty="0" smtClean="0"/>
+                  <a:t>, sodass </a:t>
+                </a:r>
+                <a14:m>
+                  <m:oMath xmlns:m="http://schemas.openxmlformats.org/officeDocument/2006/math">
+                    <m:r>
+                      <a:rPr lang="de-DE" b="0" i="1" smtClean="0">
+                        <a:latin typeface="Cambria Math" panose="02040503050406030204" pitchFamily="18" charset="0"/>
+                      </a:rPr>
+                      <m:t>𝑡</m:t>
+                    </m:r>
+                    <m:r>
+                      <a:rPr lang="de-DE" b="0" i="1" smtClean="0">
+                        <a:latin typeface="Cambria Math" panose="02040503050406030204" pitchFamily="18" charset="0"/>
+                      </a:rPr>
+                      <m:t>=</m:t>
+                    </m:r>
+                    <m:r>
+                      <a:rPr lang="de-DE" b="0" i="1" smtClean="0">
+                        <a:latin typeface="Cambria Math" panose="02040503050406030204" pitchFamily="18" charset="0"/>
+                      </a:rPr>
+                      <m:t>𝑓</m:t>
+                    </m:r>
+                    <m:r>
+                      <a:rPr lang="de-DE" b="0" i="1" smtClean="0">
+                        <a:latin typeface="Cambria Math" panose="02040503050406030204" pitchFamily="18" charset="0"/>
+                      </a:rPr>
+                      <m:t>(</m:t>
+                    </m:r>
+                    <m:r>
+                      <a:rPr lang="de-DE" b="0" i="1" smtClean="0">
+                        <a:latin typeface="Cambria Math" panose="02040503050406030204" pitchFamily="18" charset="0"/>
+                      </a:rPr>
+                      <m:t>𝑥</m:t>
+                    </m:r>
+                    <m:r>
+                      <a:rPr lang="de-DE" b="0" i="1" smtClean="0">
+                        <a:latin typeface="Cambria Math" panose="02040503050406030204" pitchFamily="18" charset="0"/>
+                      </a:rPr>
+                      <m:t>)</m:t>
+                    </m:r>
+                  </m:oMath>
+                </a14:m>
+                <a:r>
+                  <a:rPr lang="de-DE" dirty="0" smtClean="0"/>
+                  <a:t> gilt</a:t>
+                </a:r>
+              </a:p>
+              <a:p>
+                <a:pPr marL="869950" lvl="1" indent="-285750"/>
+                <a:r>
+                  <a:rPr lang="de-DE" dirty="0" smtClean="0"/>
+                  <a:t>In diesem Fall enthielte </a:t>
+                </a:r>
+                <a14:m>
+                  <m:oMath xmlns:m="http://schemas.openxmlformats.org/officeDocument/2006/math">
+                    <m:r>
+                      <a:rPr lang="de-DE" b="1" i="1">
+                        <a:latin typeface="Cambria Math" panose="02040503050406030204" pitchFamily="18" charset="0"/>
+                      </a:rPr>
+                      <m:t>𝑿</m:t>
+                    </m:r>
+                  </m:oMath>
+                </a14:m>
+                <a:r>
+                  <a:rPr lang="de-DE" dirty="0" smtClean="0"/>
+                  <a:t> verschiedene Auswertungsstellen und </a:t>
+                </a:r>
+                <a14:m>
+                  <m:oMath xmlns:m="http://schemas.openxmlformats.org/officeDocument/2006/math">
+                    <m:r>
+                      <a:rPr lang="de-DE" b="1" i="1">
+                        <a:latin typeface="Cambria Math" panose="02040503050406030204" pitchFamily="18" charset="0"/>
+                      </a:rPr>
+                      <m:t>𝑻</m:t>
+                    </m:r>
+                  </m:oMath>
+                </a14:m>
+                <a:r>
+                  <a:rPr lang="de-DE" dirty="0" smtClean="0"/>
+                  <a:t> die dazugehörigen Funktionswerte</a:t>
+                </a:r>
+              </a:p>
+              <a:p>
+                <a:pPr marL="869950" lvl="1" indent="-285750"/>
+                <a:r>
+                  <a:rPr lang="de-DE" dirty="0" smtClean="0"/>
+                  <a:t>Aufgabe wäre es nun, eine Funktion </a:t>
+                </a:r>
+                <a14:m>
+                  <m:oMath xmlns:m="http://schemas.openxmlformats.org/officeDocument/2006/math">
+                    <m:r>
+                      <a:rPr lang="de-DE" i="1">
+                        <a:latin typeface="Cambria Math" panose="02040503050406030204" pitchFamily="18" charset="0"/>
+                      </a:rPr>
+                      <m:t>𝑓</m:t>
+                    </m:r>
+                    <m:r>
+                      <a:rPr lang="de-DE" i="1">
+                        <a:latin typeface="Cambria Math" panose="02040503050406030204" pitchFamily="18" charset="0"/>
+                      </a:rPr>
+                      <m:t> </m:t>
+                    </m:r>
+                  </m:oMath>
+                </a14:m>
+                <a:r>
+                  <a:rPr lang="de-DE" dirty="0" smtClean="0"/>
+                  <a:t>zu finden, sodass an den Auswertungsstellen </a:t>
+                </a:r>
+                <a14:m>
+                  <m:oMath xmlns:m="http://schemas.openxmlformats.org/officeDocument/2006/math">
+                    <m:sSub>
+                      <m:sSubPr>
+                        <m:ctrlPr>
+                          <a:rPr lang="de-DE" i="1">
+                            <a:latin typeface="Cambria Math" panose="02040503050406030204" pitchFamily="18" charset="0"/>
+                          </a:rPr>
+                        </m:ctrlPr>
+                      </m:sSubPr>
+                      <m:e>
+                        <m:r>
+                          <a:rPr lang="de-DE" b="0" i="1" smtClean="0">
+                            <a:latin typeface="Cambria Math" panose="02040503050406030204" pitchFamily="18" charset="0"/>
+                          </a:rPr>
+                          <m:t>𝑓</m:t>
+                        </m:r>
+                        <m:r>
+                          <a:rPr lang="de-DE" b="0" i="1" smtClean="0">
+                            <a:latin typeface="Cambria Math" panose="02040503050406030204" pitchFamily="18" charset="0"/>
+                          </a:rPr>
+                          <m:t>(</m:t>
+                        </m:r>
+                        <m:r>
+                          <a:rPr lang="de-DE" b="0" i="1">
+                            <a:latin typeface="Cambria Math" panose="02040503050406030204" pitchFamily="18" charset="0"/>
+                          </a:rPr>
+                          <m:t>𝑥</m:t>
+                        </m:r>
+                      </m:e>
+                      <m:sub>
+                        <m:r>
+                          <a:rPr lang="de-DE" b="0" i="1" smtClean="0">
+                            <a:latin typeface="Cambria Math" panose="02040503050406030204" pitchFamily="18" charset="0"/>
+                          </a:rPr>
+                          <m:t>𝑖</m:t>
+                        </m:r>
+                      </m:sub>
+                    </m:sSub>
+                    <m:r>
+                      <a:rPr lang="de-DE" b="0" i="1" smtClean="0">
+                        <a:latin typeface="Cambria Math" panose="02040503050406030204" pitchFamily="18" charset="0"/>
+                      </a:rPr>
+                      <m:t>)=</m:t>
+                    </m:r>
+                    <m:sSub>
+                      <m:sSubPr>
+                        <m:ctrlPr>
+                          <a:rPr lang="de-DE" b="0" i="1" smtClean="0">
+                            <a:latin typeface="Cambria Math" panose="02040503050406030204" pitchFamily="18" charset="0"/>
+                          </a:rPr>
+                        </m:ctrlPr>
+                      </m:sSubPr>
+                      <m:e>
+                        <m:r>
+                          <a:rPr lang="de-DE" b="0" i="1" smtClean="0">
+                            <a:latin typeface="Cambria Math" panose="02040503050406030204" pitchFamily="18" charset="0"/>
+                          </a:rPr>
+                          <m:t>𝑡</m:t>
+                        </m:r>
+                      </m:e>
+                      <m:sub>
+                        <m:r>
+                          <a:rPr lang="de-DE" b="0" i="1" smtClean="0">
+                            <a:latin typeface="Cambria Math" panose="02040503050406030204" pitchFamily="18" charset="0"/>
+                          </a:rPr>
+                          <m:t>𝑖</m:t>
+                        </m:r>
+                      </m:sub>
+                    </m:sSub>
+                  </m:oMath>
+                </a14:m>
+                <a:r>
+                  <a:rPr lang="de-DE" dirty="0" smtClean="0"/>
+                  <a:t> gilt</a:t>
+                </a:r>
+              </a:p>
+              <a:p>
+                <a:pPr marL="869950" lvl="1" indent="-285750"/>
+                <a:r>
+                  <a:rPr lang="de-DE" dirty="0" smtClean="0"/>
+                  <a:t>Dieses Problem kann bei bekanntem Modell z.B. mittels einer (nicht-linearen) Regression gelöst werden</a:t>
+                </a:r>
+              </a:p>
+            </p:txBody>
+          </p:sp>
+        </mc:Choice>
+        <mc:Fallback>
+          <p:sp>
+            <p:nvSpPr>
+              <p:cNvPr id="2" name="Textplatzhalter 1"/>
+              <p:cNvSpPr>
+                <a:spLocks noGrp="1" noRot="1" noChangeAspect="1" noMove="1" noResize="1" noEditPoints="1" noAdjustHandles="1" noChangeArrowheads="1" noChangeShapeType="1" noTextEdit="1"/>
+              </p:cNvSpPr>
+              <p:nvPr>
+                <p:ph type="body" idx="1"/>
+              </p:nvPr>
+            </p:nvSpPr>
+            <p:spPr>
+              <a:xfrm>
+                <a:off x="373038" y="1052053"/>
+                <a:ext cx="11484000" cy="4778476"/>
+              </a:xfrm>
+              <a:blipFill rotWithShape="0">
+                <a:blip r:embed="rId2"/>
+                <a:stretch>
+                  <a:fillRect/>
+                </a:stretch>
+              </a:blipFill>
+            </p:spPr>
+            <p:txBody>
+              <a:bodyPr/>
+              <a:lstStyle/>
+              <a:p>
+                <a:r>
+                  <a:rPr lang="de-DE">
+                    <a:noFill/>
+                  </a:rPr>
+                  <a:t> </a:t>
+                </a:r>
+              </a:p>
+            </p:txBody>
+          </p:sp>
+        </mc:Fallback>
+      </mc:AlternateContent>
+      <p:sp>
+        <p:nvSpPr>
+          <p:cNvPr id="3" name="Titel 2"/>
+          <p:cNvSpPr>
+            <a:spLocks noGrp="1"/>
+          </p:cNvSpPr>
+          <p:nvPr>
+            <p:ph type="title"/>
+          </p:nvPr>
+        </p:nvSpPr>
+        <p:spPr/>
+        <p:txBody>
+          <a:bodyPr/>
+          <a:lstStyle/>
+          <a:p>
+            <a:r>
+              <a:rPr lang="de-DE" dirty="0" smtClean="0"/>
+              <a:t>Maschine Learning &amp; Pattern Recognition</a:t>
+            </a:r>
+            <a:endParaRPr lang="de-DE" dirty="0"/>
+          </a:p>
+        </p:txBody>
+      </p:sp>
+    </p:spTree>
+    <p:extLst>
+      <p:ext uri="{BB962C8B-B14F-4D97-AF65-F5344CB8AC3E}">
+        <p14:creationId xmlns:p14="http://schemas.microsoft.com/office/powerpoint/2010/main" val="2291346443"/>
+      </p:ext>
+    </p:extLst>
+  </p:cSld>
+  <p:clrMapOvr>
+    <a:masterClrMapping/>
+  </p:clrMapOvr>
+  <p:timing>
+    <p:tnLst>
+      <p:par>
+        <p:cTn id="1" dur="indefinite" restart="never" nodeType="tmRoot">
+          <p:childTnLst>
+            <p:seq concurrent="1" nextAc="seek">
+              <p:cTn id="2" dur="indefinite" nodeType="mainSeq">
+                <p:childTnLst>
+                  <p:par>
+                    <p:cTn id="3" fill="hold">
+                      <p:stCondLst>
+                        <p:cond delay="indefinite"/>
+                      </p:stCondLst>
+                      <p:childTnLst>
+                        <p:par>
+                          <p:cTn id="4" fill="hold">
+                            <p:stCondLst>
+                              <p:cond delay="0"/>
+                            </p:stCondLst>
+                            <p:childTnLst>
+                              <p:par>
+                                <p:cTn id="5" presetID="1" presetClass="entr" presetSubtype="0" fill="hold" nodeType="clickEffect">
+                                  <p:stCondLst>
+                                    <p:cond delay="0"/>
+                                  </p:stCondLst>
+                                  <p:childTnLst>
+                                    <p:set>
+                                      <p:cBhvr>
+                                        <p:cTn id="6" dur="1" fill="hold">
+                                          <p:stCondLst>
+                                            <p:cond delay="0"/>
+                                          </p:stCondLst>
+                                        </p:cTn>
+                                        <p:tgtEl>
+                                          <p:spTgt spid="2">
+                                            <p:txEl>
+                                              <p:pRg st="0" end="0"/>
+                                            </p:txEl>
+                                          </p:spTgt>
+                                        </p:tgtEl>
+                                        <p:attrNameLst>
+                                          <p:attrName>style.visibility</p:attrName>
+                                        </p:attrNameLst>
+                                      </p:cBhvr>
+                                      <p:to>
+                                        <p:strVal val="visible"/>
+                                      </p:to>
+                                    </p:set>
+                                  </p:childTnLst>
+                                </p:cTn>
+                              </p:par>
+                              <p:par>
+                                <p:cTn id="7" presetID="1" presetClass="entr" presetSubtype="0" fill="hold" nodeType="withEffect">
+                                  <p:stCondLst>
+                                    <p:cond delay="0"/>
+                                  </p:stCondLst>
+                                  <p:childTnLst>
+                                    <p:set>
+                                      <p:cBhvr>
+                                        <p:cTn id="8" dur="1" fill="hold">
+                                          <p:stCondLst>
+                                            <p:cond delay="0"/>
+                                          </p:stCondLst>
+                                        </p:cTn>
+                                        <p:tgtEl>
+                                          <p:spTgt spid="2">
+                                            <p:txEl>
+                                              <p:pRg st="1" end="1"/>
+                                            </p:txEl>
+                                          </p:spTgt>
+                                        </p:tgtEl>
+                                        <p:attrNameLst>
+                                          <p:attrName>style.visibility</p:attrName>
+                                        </p:attrNameLst>
+                                      </p:cBhvr>
+                                      <p:to>
+                                        <p:strVal val="visible"/>
+                                      </p:to>
+                                    </p:set>
+                                  </p:childTnLst>
+                                </p:cTn>
+                              </p:par>
+                            </p:childTnLst>
+                          </p:cTn>
+                        </p:par>
+                      </p:childTnLst>
+                    </p:cTn>
+                  </p:par>
+                  <p:par>
+                    <p:cTn id="9" fill="hold">
+                      <p:stCondLst>
+                        <p:cond delay="indefinite"/>
+                      </p:stCondLst>
+                      <p:childTnLst>
+                        <p:par>
+                          <p:cTn id="10" fill="hold">
+                            <p:stCondLst>
+                              <p:cond delay="0"/>
+                            </p:stCondLst>
+                            <p:childTnLst>
+                              <p:par>
+                                <p:cTn id="11" presetID="1" presetClass="entr" presetSubtype="0" fill="hold" nodeType="clickEffect">
+                                  <p:stCondLst>
+                                    <p:cond delay="0"/>
+                                  </p:stCondLst>
+                                  <p:childTnLst>
+                                    <p:set>
+                                      <p:cBhvr>
+                                        <p:cTn id="12" dur="1" fill="hold">
+                                          <p:stCondLst>
+                                            <p:cond delay="0"/>
+                                          </p:stCondLst>
+                                        </p:cTn>
+                                        <p:tgtEl>
+                                          <p:spTgt spid="2">
+                                            <p:txEl>
+                                              <p:pRg st="4" end="4"/>
+                                            </p:txEl>
+                                          </p:spTgt>
+                                        </p:tgtEl>
+                                        <p:attrNameLst>
+                                          <p:attrName>style.visibility</p:attrName>
+                                        </p:attrNameLst>
+                                      </p:cBhvr>
+                                      <p:to>
+                                        <p:strVal val="visible"/>
+                                      </p:to>
+                                    </p:set>
+                                  </p:childTnLst>
+                                </p:cTn>
+                              </p:par>
+                              <p:par>
+                                <p:cTn id="13" presetID="1" presetClass="entr" presetSubtype="0" fill="hold" nodeType="withEffect">
+                                  <p:stCondLst>
+                                    <p:cond delay="0"/>
+                                  </p:stCondLst>
+                                  <p:childTnLst>
+                                    <p:set>
+                                      <p:cBhvr>
+                                        <p:cTn id="14" dur="1" fill="hold">
+                                          <p:stCondLst>
+                                            <p:cond delay="0"/>
+                                          </p:stCondLst>
+                                        </p:cTn>
+                                        <p:tgtEl>
+                                          <p:spTgt spid="2">
+                                            <p:txEl>
+                                              <p:pRg st="5" end="5"/>
+                                            </p:txEl>
+                                          </p:spTgt>
+                                        </p:tgtEl>
+                                        <p:attrNameLst>
+                                          <p:attrName>style.visibility</p:attrName>
+                                        </p:attrNameLst>
+                                      </p:cBhvr>
+                                      <p:to>
+                                        <p:strVal val="visible"/>
+                                      </p:to>
+                                    </p:set>
+                                  </p:childTnLst>
+                                </p:cTn>
+                              </p:par>
+                            </p:childTnLst>
+                          </p:cTn>
+                        </p:par>
+                      </p:childTnLst>
+                    </p:cTn>
+                  </p:par>
+                  <p:par>
+                    <p:cTn id="15" fill="hold">
+                      <p:stCondLst>
+                        <p:cond delay="indefinite"/>
+                      </p:stCondLst>
+                      <p:childTnLst>
+                        <p:par>
+                          <p:cTn id="16" fill="hold">
+                            <p:stCondLst>
+                              <p:cond delay="0"/>
+                            </p:stCondLst>
+                            <p:childTnLst>
+                              <p:par>
+                                <p:cTn id="17" presetID="1" presetClass="entr" presetSubtype="0" fill="hold" nodeType="clickEffect">
+                                  <p:stCondLst>
+                                    <p:cond delay="0"/>
+                                  </p:stCondLst>
+                                  <p:childTnLst>
+                                    <p:set>
+                                      <p:cBhvr>
+                                        <p:cTn id="18" dur="1" fill="hold">
+                                          <p:stCondLst>
+                                            <p:cond delay="0"/>
+                                          </p:stCondLst>
+                                        </p:cTn>
+                                        <p:tgtEl>
+                                          <p:spTgt spid="2">
+                                            <p:txEl>
+                                              <p:pRg st="9" end="9"/>
+                                            </p:txEl>
+                                          </p:spTgt>
+                                        </p:tgtEl>
+                                        <p:attrNameLst>
+                                          <p:attrName>style.visibility</p:attrName>
+                                        </p:attrNameLst>
+                                      </p:cBhvr>
+                                      <p:to>
+                                        <p:strVal val="visible"/>
+                                      </p:to>
+                                    </p:set>
+                                  </p:childTnLst>
+                                </p:cTn>
+                              </p:par>
+                              <p:par>
+                                <p:cTn id="19" presetID="1" presetClass="entr" presetSubtype="0" fill="hold" nodeType="withEffect">
+                                  <p:stCondLst>
+                                    <p:cond delay="0"/>
+                                  </p:stCondLst>
+                                  <p:childTnLst>
+                                    <p:set>
+                                      <p:cBhvr>
+                                        <p:cTn id="20" dur="1" fill="hold">
+                                          <p:stCondLst>
+                                            <p:cond delay="0"/>
+                                          </p:stCondLst>
+                                        </p:cTn>
+                                        <p:tgtEl>
+                                          <p:spTgt spid="2">
+                                            <p:txEl>
+                                              <p:pRg st="10" end="10"/>
+                                            </p:txEl>
+                                          </p:spTgt>
+                                        </p:tgtEl>
+                                        <p:attrNameLst>
+                                          <p:attrName>style.visibility</p:attrName>
+                                        </p:attrNameLst>
+                                      </p:cBhvr>
+                                      <p:to>
+                                        <p:strVal val="visible"/>
+                                      </p:to>
+                                    </p:set>
+                                  </p:childTnLst>
+                                </p:cTn>
+                              </p:par>
+                              <p:par>
+                                <p:cTn id="21" presetID="1" presetClass="entr" presetSubtype="0" fill="hold" nodeType="withEffect">
+                                  <p:stCondLst>
+                                    <p:cond delay="0"/>
+                                  </p:stCondLst>
+                                  <p:childTnLst>
+                                    <p:set>
+                                      <p:cBhvr>
+                                        <p:cTn id="22" dur="1" fill="hold">
+                                          <p:stCondLst>
+                                            <p:cond delay="0"/>
+                                          </p:stCondLst>
+                                        </p:cTn>
+                                        <p:tgtEl>
+                                          <p:spTgt spid="2">
+                                            <p:txEl>
+                                              <p:pRg st="11" end="11"/>
+                                            </p:txEl>
+                                          </p:spTgt>
+                                        </p:tgtEl>
+                                        <p:attrNameLst>
+                                          <p:attrName>style.visibility</p:attrName>
+                                        </p:attrNameLst>
+                                      </p:cBhvr>
+                                      <p:to>
+                                        <p:strVal val="visible"/>
+                                      </p:to>
+                                    </p:set>
+                                  </p:childTnLst>
+                                </p:cTn>
+                              </p:par>
+                              <p:par>
+                                <p:cTn id="23" presetID="1" presetClass="entr" presetSubtype="0" fill="hold" nodeType="withEffect">
+                                  <p:stCondLst>
+                                    <p:cond delay="0"/>
+                                  </p:stCondLst>
+                                  <p:childTnLst>
+                                    <p:set>
+                                      <p:cBhvr>
+                                        <p:cTn id="24" dur="1" fill="hold">
+                                          <p:stCondLst>
+                                            <p:cond delay="0"/>
+                                          </p:stCondLst>
+                                        </p:cTn>
+                                        <p:tgtEl>
+                                          <p:spTgt spid="2">
+                                            <p:txEl>
+                                              <p:pRg st="12" end="12"/>
+                                            </p:txEl>
+                                          </p:spTgt>
+                                        </p:tgtEl>
+                                        <p:attrNameLst>
+                                          <p:attrName>style.visibility</p:attrName>
+                                        </p:attrNameLst>
+                                      </p:cBhvr>
+                                      <p:to>
+                                        <p:strVal val="visible"/>
+                                      </p:to>
+                                    </p:set>
+                                  </p:childTnLst>
+                                </p:cTn>
+                              </p:par>
+                              <p:par>
+                                <p:cTn id="25" presetID="1" presetClass="entr" presetSubtype="0" fill="hold" nodeType="withEffect">
+                                  <p:stCondLst>
+                                    <p:cond delay="0"/>
+                                  </p:stCondLst>
+                                  <p:childTnLst>
+                                    <p:set>
+                                      <p:cBhvr>
+                                        <p:cTn id="26" dur="1" fill="hold">
+                                          <p:stCondLst>
+                                            <p:cond delay="0"/>
+                                          </p:stCondLst>
+                                        </p:cTn>
+                                        <p:tgtEl>
+                                          <p:spTgt spid="2">
+                                            <p:txEl>
+                                              <p:pRg st="13" end="13"/>
+                                            </p:txEl>
+                                          </p:spTgt>
+                                        </p:tgtEl>
+                                        <p:attrNameLst>
+                                          <p:attrName>style.visibility</p:attrName>
+                                        </p:attrNameLst>
+                                      </p:cBhvr>
+                                      <p:to>
+                                        <p:strVal val="visible"/>
+                                      </p:to>
+                                    </p:set>
+                                  </p:childTnLst>
+                                </p:cTn>
+                              </p:par>
+                            </p:childTnLst>
+                          </p:cTn>
+                        </p:par>
+                      </p:childTnLst>
+                    </p:cTn>
+                  </p:par>
+                </p:childTnLst>
+              </p:cTn>
+              <p:prevCondLst>
+                <p:cond evt="onPrev" delay="0">
+                  <p:tgtEl>
+                    <p:sldTgt/>
+                  </p:tgtEl>
+                </p:cond>
+              </p:prevCondLst>
+              <p:nextCondLst>
+                <p:cond evt="onNext" delay="0">
+                  <p:tgtEl>
+                    <p:sldTgt/>
+                  </p:tgtEl>
+                </p:cond>
+              </p:nextCondLst>
+            </p:seq>
+          </p:childTnLst>
+        </p:cTn>
+      </p:par>
+    </p:tnLst>
+  </p:timing>
+</p:sld>
+</file>
+
+<file path=ppt/slides/slide22.xml><?xml version="1.0" encoding="utf-8"?>
+<p:sld xmlns:a="http://schemas.openxmlformats.org/drawingml/2006/main" xmlns:r="http://schemas.openxmlformats.org/officeDocument/2006/relationships" xmlns:p="http://schemas.openxmlformats.org/presentationml/2006/main">
+  <p:cSld>
+    <p:spTree>
+      <p:nvGrpSpPr>
+        <p:cNvPr id="1" name=""/>
+        <p:cNvGrpSpPr/>
+        <p:nvPr/>
+      </p:nvGrpSpPr>
+      <p:grpSpPr>
+        <a:xfrm>
+          <a:off x="0" y="0"/>
+          <a:ext cx="0" cy="0"/>
+          <a:chOff x="0" y="0"/>
+          <a:chExt cx="0" cy="0"/>
+        </a:xfrm>
+      </p:grpSpPr>
+      <mc:AlternateContent xmlns:mc="http://schemas.openxmlformats.org/markup-compatibility/2006">
+        <mc:Choice xmlns:a14="http://schemas.microsoft.com/office/drawing/2010/main" Requires="a14">
+          <p:sp>
+            <p:nvSpPr>
+              <p:cNvPr id="2" name="Textplatzhalter 1"/>
+              <p:cNvSpPr>
+                <a:spLocks noGrp="1"/>
+              </p:cNvSpPr>
+              <p:nvPr>
+                <p:ph type="body" idx="1"/>
+              </p:nvPr>
+            </p:nvSpPr>
+            <p:spPr>
+              <a:xfrm>
+                <a:off x="373038" y="1052053"/>
+                <a:ext cx="11484000" cy="4778476"/>
+              </a:xfrm>
+            </p:spPr>
+            <p:txBody>
+              <a:bodyPr/>
+              <a:lstStyle/>
+              <a:p>
+                <a:pPr marL="412750" indent="-285750"/>
+                <a:r>
+                  <a:rPr lang="de-DE" b="1" dirty="0" smtClean="0"/>
+                  <a:t>Probleme</a:t>
+                </a:r>
+                <a:r>
+                  <a:rPr lang="de-DE" dirty="0" smtClean="0"/>
+                  <a:t>:</a:t>
+                </a:r>
+              </a:p>
+              <a:p>
+                <a:pPr marL="869950" lvl="1" indent="-285750"/>
+                <a:r>
+                  <a:rPr lang="de-DE" dirty="0" smtClean="0"/>
+                  <a:t>Wie geht man vor, wenn das Modell (hier die Funktion </a:t>
+                </a:r>
+                <a14:m>
+                  <m:oMath xmlns:m="http://schemas.openxmlformats.org/officeDocument/2006/math">
+                    <m:r>
+                      <a:rPr lang="de-DE" i="1">
+                        <a:latin typeface="Cambria Math" panose="02040503050406030204" pitchFamily="18" charset="0"/>
+                      </a:rPr>
+                      <m:t>𝑓</m:t>
+                    </m:r>
+                  </m:oMath>
+                </a14:m>
+                <a:r>
+                  <a:rPr lang="de-DE" dirty="0" smtClean="0"/>
+                  <a:t>) nicht bekannt ist?</a:t>
+                </a:r>
+              </a:p>
+              <a:p>
+                <a:pPr marL="869950" lvl="1" indent="-285750"/>
+                <a:r>
+                  <a:rPr lang="de-DE" dirty="0" smtClean="0"/>
+                  <a:t>Oft können die Daten nicht eindeutig Modellen zugeordnet werden:</a:t>
+                </a:r>
+              </a:p>
+              <a:p>
+                <a:pPr marL="1327150" lvl="2" indent="-285750"/>
+                <a:r>
+                  <a:rPr lang="de-DE" dirty="0" smtClean="0"/>
+                  <a:t>gegeben seien Punkte in </a:t>
+                </a:r>
+                <a14:m>
+                  <m:oMath xmlns:m="http://schemas.openxmlformats.org/officeDocument/2006/math">
+                    <m:sSup>
+                      <m:sSupPr>
+                        <m:ctrlPr>
+                          <a:rPr lang="de-DE" b="0" i="1" smtClean="0">
+                            <a:latin typeface="Cambria Math" panose="02040503050406030204" pitchFamily="18" charset="0"/>
+                          </a:rPr>
+                        </m:ctrlPr>
+                      </m:sSupPr>
+                      <m:e>
+                        <m:r>
+                          <a:rPr lang="de-DE" b="0" i="1" smtClean="0">
+                            <a:latin typeface="Cambria Math" panose="02040503050406030204" pitchFamily="18" charset="0"/>
+                          </a:rPr>
+                          <m:t>ℝ</m:t>
+                        </m:r>
+                      </m:e>
+                      <m:sup>
+                        <m:r>
+                          <a:rPr lang="de-DE" b="0" i="1" smtClean="0">
+                            <a:latin typeface="Cambria Math" panose="02040503050406030204" pitchFamily="18" charset="0"/>
+                          </a:rPr>
+                          <m:t>2</m:t>
+                        </m:r>
+                      </m:sup>
+                    </m:sSup>
+                  </m:oMath>
+                </a14:m>
+                <a:r>
+                  <a:rPr lang="de-DE" dirty="0" smtClean="0"/>
+                  <a:t> : </a:t>
+                </a:r>
+                <a14:m>
+                  <m:oMath xmlns:m="http://schemas.openxmlformats.org/officeDocument/2006/math">
+                    <m:d>
+                      <m:dPr>
+                        <m:ctrlPr>
+                          <a:rPr lang="de-DE" i="1">
+                            <a:latin typeface="Cambria Math" panose="02040503050406030204" pitchFamily="18" charset="0"/>
+                          </a:rPr>
+                        </m:ctrlPr>
+                      </m:dPr>
+                      <m:e>
+                        <m:r>
+                          <a:rPr lang="de-DE" b="1" i="1">
+                            <a:latin typeface="Cambria Math" panose="02040503050406030204" pitchFamily="18" charset="0"/>
+                          </a:rPr>
+                          <m:t>𝑿</m:t>
+                        </m:r>
+                        <m:r>
+                          <a:rPr lang="de-DE" b="1" i="1">
+                            <a:latin typeface="Cambria Math" panose="02040503050406030204" pitchFamily="18" charset="0"/>
+                          </a:rPr>
+                          <m:t>,</m:t>
+                        </m:r>
+                        <m:r>
+                          <a:rPr lang="de-DE" b="1" i="1">
+                            <a:latin typeface="Cambria Math" panose="02040503050406030204" pitchFamily="18" charset="0"/>
+                          </a:rPr>
+                          <m:t>𝑻</m:t>
+                        </m:r>
+                      </m:e>
+                    </m:d>
+                    <m:r>
+                      <a:rPr lang="de-DE" b="1" i="1">
+                        <a:latin typeface="Cambria Math" panose="02040503050406030204" pitchFamily="18" charset="0"/>
+                      </a:rPr>
+                      <m:t>≔{</m:t>
+                    </m:r>
+                    <m:d>
+                      <m:dPr>
+                        <m:ctrlPr>
+                          <a:rPr lang="de-DE" i="1">
+                            <a:latin typeface="Cambria Math" panose="02040503050406030204" pitchFamily="18" charset="0"/>
+                          </a:rPr>
+                        </m:ctrlPr>
+                      </m:dPr>
+                      <m:e>
+                        <m:r>
+                          <a:rPr lang="de-DE" b="0" i="1" smtClean="0">
+                            <a:latin typeface="Cambria Math" panose="02040503050406030204" pitchFamily="18" charset="0"/>
+                          </a:rPr>
+                          <m:t>−1</m:t>
+                        </m:r>
+                        <m:r>
+                          <a:rPr lang="de-DE" b="0" i="1">
+                            <a:latin typeface="Cambria Math" panose="02040503050406030204" pitchFamily="18" charset="0"/>
+                          </a:rPr>
+                          <m:t>,</m:t>
+                        </m:r>
+                        <m:r>
+                          <a:rPr lang="de-DE" b="0" i="1" smtClean="0">
+                            <a:latin typeface="Cambria Math" panose="02040503050406030204" pitchFamily="18" charset="0"/>
+                          </a:rPr>
+                          <m:t>1</m:t>
+                        </m:r>
+                      </m:e>
+                    </m:d>
+                    <m:r>
+                      <a:rPr lang="de-DE" b="0" i="1">
+                        <a:latin typeface="Cambria Math" panose="02040503050406030204" pitchFamily="18" charset="0"/>
+                      </a:rPr>
+                      <m:t>,</m:t>
+                    </m:r>
+                    <m:r>
+                      <a:rPr lang="de-DE" b="0" i="1" smtClean="0">
+                        <a:latin typeface="Cambria Math" panose="02040503050406030204" pitchFamily="18" charset="0"/>
+                      </a:rPr>
+                      <m:t>(0,0)</m:t>
+                    </m:r>
+                    <m:r>
+                      <a:rPr lang="de-DE" b="0" i="1">
+                        <a:latin typeface="Cambria Math" panose="02040503050406030204" pitchFamily="18" charset="0"/>
+                      </a:rPr>
+                      <m:t>,(</m:t>
+                    </m:r>
+                    <m:r>
+                      <a:rPr lang="de-DE" b="0" i="1" smtClean="0">
+                        <a:latin typeface="Cambria Math" panose="02040503050406030204" pitchFamily="18" charset="0"/>
+                      </a:rPr>
+                      <m:t>1</m:t>
+                    </m:r>
+                    <m:r>
+                      <a:rPr lang="de-DE" b="0" i="1">
+                        <a:latin typeface="Cambria Math" panose="02040503050406030204" pitchFamily="18" charset="0"/>
+                      </a:rPr>
+                      <m:t>,</m:t>
+                    </m:r>
+                    <m:r>
+                      <a:rPr lang="de-DE" b="0" i="1" smtClean="0">
+                        <a:latin typeface="Cambria Math" panose="02040503050406030204" pitchFamily="18" charset="0"/>
+                      </a:rPr>
+                      <m:t>1</m:t>
+                    </m:r>
+                    <m:r>
+                      <a:rPr lang="de-DE" b="0" i="1">
+                        <a:latin typeface="Cambria Math" panose="02040503050406030204" pitchFamily="18" charset="0"/>
+                      </a:rPr>
+                      <m:t>)}</m:t>
+                    </m:r>
+                  </m:oMath>
+                </a14:m>
+                <a:r>
+                  <a:rPr lang="de-DE" dirty="0"/>
+                  <a:t> </a:t>
+                </a:r>
+                <a:endParaRPr lang="de-DE" dirty="0" smtClean="0"/>
+              </a:p>
+              <a:p>
+                <a:pPr marL="1327150" lvl="2" indent="-285750"/>
+                <a:r>
+                  <a:rPr lang="de-DE" dirty="0" smtClean="0"/>
+                  <a:t>Mögliche erzeugende Funktionen:</a:t>
+                </a:r>
+              </a:p>
+              <a:p>
+                <a:pPr marL="1784350" lvl="3" indent="-285750"/>
+                <a14:m>
+                  <m:oMath xmlns:m="http://schemas.openxmlformats.org/officeDocument/2006/math">
+                    <m:sSub>
+                      <m:sSubPr>
+                        <m:ctrlPr>
+                          <a:rPr lang="de-DE" b="0" i="1" smtClean="0">
+                            <a:latin typeface="Cambria Math" panose="02040503050406030204" pitchFamily="18" charset="0"/>
+                          </a:rPr>
+                        </m:ctrlPr>
+                      </m:sSubPr>
+                      <m:e>
+                        <m:r>
+                          <a:rPr lang="de-DE" b="0" i="1" smtClean="0">
+                            <a:latin typeface="Cambria Math" panose="02040503050406030204" pitchFamily="18" charset="0"/>
+                          </a:rPr>
+                          <m:t>𝑓</m:t>
+                        </m:r>
+                      </m:e>
+                      <m:sub>
+                        <m:r>
+                          <a:rPr lang="de-DE" b="0" i="1" smtClean="0">
+                            <a:latin typeface="Cambria Math" panose="02040503050406030204" pitchFamily="18" charset="0"/>
+                          </a:rPr>
+                          <m:t>1</m:t>
+                        </m:r>
+                      </m:sub>
+                    </m:sSub>
+                    <m:d>
+                      <m:dPr>
+                        <m:ctrlPr>
+                          <a:rPr lang="de-DE" b="0" i="1" smtClean="0">
+                            <a:latin typeface="Cambria Math" panose="02040503050406030204" pitchFamily="18" charset="0"/>
+                          </a:rPr>
+                        </m:ctrlPr>
+                      </m:dPr>
+                      <m:e>
+                        <m:r>
+                          <a:rPr lang="de-DE" b="0" i="1" smtClean="0">
+                            <a:latin typeface="Cambria Math" panose="02040503050406030204" pitchFamily="18" charset="0"/>
+                          </a:rPr>
+                          <m:t>𝑥</m:t>
+                        </m:r>
+                      </m:e>
+                    </m:d>
+                    <m:r>
+                      <a:rPr lang="de-DE" b="0" i="1" smtClean="0">
+                        <a:latin typeface="Cambria Math" panose="02040503050406030204" pitchFamily="18" charset="0"/>
+                      </a:rPr>
+                      <m:t>=</m:t>
+                    </m:r>
+                    <m:sSup>
+                      <m:sSupPr>
+                        <m:ctrlPr>
+                          <a:rPr lang="de-DE" b="0" i="1" smtClean="0">
+                            <a:latin typeface="Cambria Math" panose="02040503050406030204" pitchFamily="18" charset="0"/>
+                          </a:rPr>
+                        </m:ctrlPr>
+                      </m:sSupPr>
+                      <m:e>
+                        <m:r>
+                          <a:rPr lang="de-DE" b="0" i="1" smtClean="0">
+                            <a:latin typeface="Cambria Math" panose="02040503050406030204" pitchFamily="18" charset="0"/>
+                          </a:rPr>
+                          <m:t>𝑥</m:t>
+                        </m:r>
+                      </m:e>
+                      <m:sup>
+                        <m:r>
+                          <a:rPr lang="de-DE" b="0" i="1" smtClean="0">
+                            <a:latin typeface="Cambria Math" panose="02040503050406030204" pitchFamily="18" charset="0"/>
+                          </a:rPr>
+                          <m:t>2</m:t>
+                        </m:r>
+                      </m:sup>
+                    </m:sSup>
+                  </m:oMath>
+                </a14:m>
+                <a:r>
+                  <a:rPr lang="de-DE" dirty="0" smtClean="0"/>
+                  <a:t> </a:t>
+                </a:r>
+              </a:p>
+              <a:p>
+                <a:pPr marL="1784350" lvl="3" indent="-285750"/>
+                <a14:m>
+                  <m:oMath xmlns:m="http://schemas.openxmlformats.org/officeDocument/2006/math">
+                    <m:sSub>
+                      <m:sSubPr>
+                        <m:ctrlPr>
+                          <a:rPr lang="de-DE" b="0" i="1" smtClean="0">
+                            <a:latin typeface="Cambria Math" panose="02040503050406030204" pitchFamily="18" charset="0"/>
+                          </a:rPr>
+                        </m:ctrlPr>
+                      </m:sSubPr>
+                      <m:e>
+                        <m:r>
+                          <a:rPr lang="de-DE" b="0" i="1" smtClean="0">
+                            <a:latin typeface="Cambria Math" panose="02040503050406030204" pitchFamily="18" charset="0"/>
+                          </a:rPr>
+                          <m:t>𝑓</m:t>
+                        </m:r>
+                      </m:e>
+                      <m:sub>
+                        <m:r>
+                          <a:rPr lang="de-DE" b="0" i="1" smtClean="0">
+                            <a:latin typeface="Cambria Math" panose="02040503050406030204" pitchFamily="18" charset="0"/>
+                          </a:rPr>
+                          <m:t>2</m:t>
+                        </m:r>
+                      </m:sub>
+                    </m:sSub>
+                    <m:d>
+                      <m:dPr>
+                        <m:ctrlPr>
+                          <a:rPr lang="de-DE" b="0" i="1" smtClean="0">
+                            <a:latin typeface="Cambria Math" panose="02040503050406030204" pitchFamily="18" charset="0"/>
+                          </a:rPr>
+                        </m:ctrlPr>
+                      </m:dPr>
+                      <m:e>
+                        <m:r>
+                          <a:rPr lang="de-DE" b="0" i="1" smtClean="0">
+                            <a:latin typeface="Cambria Math" panose="02040503050406030204" pitchFamily="18" charset="0"/>
+                          </a:rPr>
+                          <m:t>𝑥</m:t>
+                        </m:r>
+                      </m:e>
+                    </m:d>
+                    <m:r>
+                      <a:rPr lang="de-DE" b="0" i="1" smtClean="0">
+                        <a:latin typeface="Cambria Math" panose="02040503050406030204" pitchFamily="18" charset="0"/>
+                      </a:rPr>
+                      <m:t>=−0.5</m:t>
+                    </m:r>
+                    <m:func>
+                      <m:funcPr>
+                        <m:ctrlPr>
+                          <a:rPr lang="de-DE" b="0" i="1" smtClean="0">
+                            <a:latin typeface="Cambria Math" panose="02040503050406030204" pitchFamily="18" charset="0"/>
+                          </a:rPr>
+                        </m:ctrlPr>
+                      </m:funcPr>
+                      <m:fName>
+                        <m:r>
+                          <m:rPr>
+                            <m:sty m:val="p"/>
+                          </m:rPr>
+                          <a:rPr lang="de-DE" b="0" i="0" smtClean="0">
+                            <a:latin typeface="Cambria Math" panose="02040503050406030204" pitchFamily="18" charset="0"/>
+                          </a:rPr>
+                          <m:t>cos</m:t>
+                        </m:r>
+                      </m:fName>
+                      <m:e>
+                        <m:d>
+                          <m:dPr>
+                            <m:ctrlPr>
+                              <a:rPr lang="de-DE" b="0" i="1" smtClean="0">
+                                <a:latin typeface="Cambria Math" panose="02040503050406030204" pitchFamily="18" charset="0"/>
+                              </a:rPr>
+                            </m:ctrlPr>
+                          </m:dPr>
+                          <m:e>
+                            <m:r>
+                              <a:rPr lang="de-DE" b="0" i="1" smtClean="0">
+                                <a:latin typeface="Cambria Math" panose="02040503050406030204" pitchFamily="18" charset="0"/>
+                              </a:rPr>
+                              <m:t>𝜋</m:t>
+                            </m:r>
+                            <m:r>
+                              <a:rPr lang="de-DE" b="0" i="1" smtClean="0">
+                                <a:latin typeface="Cambria Math" panose="02040503050406030204" pitchFamily="18" charset="0"/>
+                              </a:rPr>
+                              <m:t>𝑥</m:t>
+                            </m:r>
+                          </m:e>
+                        </m:d>
+                      </m:e>
+                    </m:func>
+                    <m:r>
+                      <a:rPr lang="de-DE" b="0" i="1" smtClean="0">
+                        <a:latin typeface="Cambria Math" panose="02040503050406030204" pitchFamily="18" charset="0"/>
+                      </a:rPr>
+                      <m:t>+0.5</m:t>
+                    </m:r>
+                  </m:oMath>
+                </a14:m>
+                <a:r>
+                  <a:rPr lang="de-DE" dirty="0" smtClean="0"/>
+                  <a:t> </a:t>
+                </a:r>
+              </a:p>
+              <a:p>
+                <a:pPr marL="127000" indent="0">
+                  <a:buNone/>
+                </a:pPr>
+                <a:endParaRPr lang="de-DE" dirty="0"/>
+              </a:p>
+              <a:p>
+                <a:pPr marL="412750" indent="-285750"/>
+                <a:r>
+                  <a:rPr lang="de-DE" b="1" dirty="0" smtClean="0"/>
+                  <a:t>Ideen</a:t>
+                </a:r>
+                <a:r>
+                  <a:rPr lang="de-DE" dirty="0" smtClean="0"/>
+                  <a:t>:</a:t>
+                </a:r>
+              </a:p>
+              <a:p>
+                <a:pPr marL="869950" lvl="1" indent="-285750"/>
+                <a:r>
+                  <a:rPr lang="de-DE" dirty="0" smtClean="0"/>
+                  <a:t>Leite </a:t>
+                </a:r>
+                <a14:m>
+                  <m:oMath xmlns:m="http://schemas.openxmlformats.org/officeDocument/2006/math">
+                    <m:r>
+                      <a:rPr lang="de-DE" i="1">
+                        <a:latin typeface="Cambria Math" panose="02040503050406030204" pitchFamily="18" charset="0"/>
+                      </a:rPr>
+                      <m:t>𝑓</m:t>
+                    </m:r>
+                  </m:oMath>
+                </a14:m>
+                <a:r>
+                  <a:rPr lang="de-DE" dirty="0" smtClean="0"/>
+                  <a:t> aus den Daten ab! </a:t>
+                </a:r>
+                <a:r>
+                  <a:rPr lang="de-DE" dirty="0" smtClean="0">
+                    <a:sym typeface="Wingdings" panose="05000000000000000000" pitchFamily="2" charset="2"/>
+                  </a:rPr>
+                  <a:t> Erkennen von Mustern in den Daten („Pattern Recognition“)</a:t>
+                </a:r>
+              </a:p>
+              <a:p>
+                <a:pPr marL="869950" lvl="1" indent="-285750"/>
+                <a:r>
+                  <a:rPr lang="de-DE" dirty="0" smtClean="0">
+                    <a:sym typeface="Wingdings" panose="05000000000000000000" pitchFamily="2" charset="2"/>
+                  </a:rPr>
+                  <a:t>Entscheide auf Basis der Daten, welches Modell </a:t>
+                </a:r>
+                <a:r>
+                  <a:rPr lang="de-DE" b="1" i="1" u="sng" dirty="0" smtClean="0">
+                    <a:sym typeface="Wingdings" panose="05000000000000000000" pitchFamily="2" charset="2"/>
+                  </a:rPr>
+                  <a:t>wahrscheinlicher</a:t>
+                </a:r>
+                <a:r>
+                  <a:rPr lang="de-DE" dirty="0" smtClean="0">
+                    <a:sym typeface="Wingdings" panose="05000000000000000000" pitchFamily="2" charset="2"/>
+                  </a:rPr>
+                  <a:t> ist </a:t>
+                </a:r>
+              </a:p>
+              <a:p>
+                <a:pPr marL="869950" lvl="1" indent="-285750"/>
+                <a:r>
+                  <a:rPr lang="de-DE" dirty="0"/>
+                  <a:t>Je mehr Daten verfügbar sind, </a:t>
+                </a:r>
+                <a:r>
+                  <a:rPr lang="de-DE" dirty="0" smtClean="0"/>
+                  <a:t>desto weniger Einfluss haben Störungen (z.B. fehlerhafte Messungen) und desto präziser kann eine Voraussage gemacht werden</a:t>
+                </a:r>
+                <a:endParaRPr lang="de-DE" dirty="0" smtClean="0">
+                  <a:sym typeface="Wingdings" panose="05000000000000000000" pitchFamily="2" charset="2"/>
+                </a:endParaRPr>
+              </a:p>
+              <a:p>
+                <a:pPr marL="412750" indent="-285750"/>
+                <a:endParaRPr lang="de-DE" dirty="0">
+                  <a:sym typeface="Wingdings" panose="05000000000000000000" pitchFamily="2" charset="2"/>
+                </a:endParaRPr>
+              </a:p>
+              <a:p>
+                <a:pPr marL="412750" indent="-285750"/>
+                <a:r>
+                  <a:rPr lang="de-DE" b="1" dirty="0" smtClean="0">
+                    <a:sym typeface="Wingdings" panose="05000000000000000000" pitchFamily="2" charset="2"/>
+                  </a:rPr>
+                  <a:t>Hilfsmittel</a:t>
+                </a:r>
+                <a:r>
+                  <a:rPr lang="de-DE" dirty="0" smtClean="0">
+                    <a:sym typeface="Wingdings" panose="05000000000000000000" pitchFamily="2" charset="2"/>
+                  </a:rPr>
+                  <a:t>:</a:t>
+                </a:r>
+              </a:p>
+              <a:p>
+                <a:pPr marL="869950" lvl="1" indent="-285750"/>
+                <a:r>
+                  <a:rPr lang="de-DE" dirty="0" smtClean="0">
+                    <a:sym typeface="Wingdings" panose="05000000000000000000" pitchFamily="2" charset="2"/>
+                  </a:rPr>
+                  <a:t>Wahrscheinlichkeitsrechnung</a:t>
+                </a:r>
+              </a:p>
+              <a:p>
+                <a:pPr marL="869950" lvl="1" indent="-285750"/>
+                <a:r>
+                  <a:rPr lang="de-DE" dirty="0" smtClean="0">
+                    <a:sym typeface="Wingdings" panose="05000000000000000000" pitchFamily="2" charset="2"/>
+                  </a:rPr>
+                  <a:t>Optimierung</a:t>
+                </a:r>
+              </a:p>
+            </p:txBody>
+          </p:sp>
+        </mc:Choice>
+        <mc:Fallback>
+          <p:sp>
+            <p:nvSpPr>
+              <p:cNvPr id="2" name="Textplatzhalter 1"/>
+              <p:cNvSpPr>
+                <a:spLocks noGrp="1" noRot="1" noChangeAspect="1" noMove="1" noResize="1" noEditPoints="1" noAdjustHandles="1" noChangeArrowheads="1" noChangeShapeType="1" noTextEdit="1"/>
+              </p:cNvSpPr>
+              <p:nvPr>
+                <p:ph type="body" idx="1"/>
+              </p:nvPr>
+            </p:nvSpPr>
+            <p:spPr>
+              <a:xfrm>
+                <a:off x="373038" y="1052053"/>
+                <a:ext cx="11484000" cy="4778476"/>
+              </a:xfrm>
+              <a:blipFill rotWithShape="0">
+                <a:blip r:embed="rId2"/>
+                <a:stretch>
+                  <a:fillRect/>
+                </a:stretch>
+              </a:blipFill>
+            </p:spPr>
+            <p:txBody>
+              <a:bodyPr/>
+              <a:lstStyle/>
+              <a:p>
+                <a:r>
+                  <a:rPr lang="de-DE">
+                    <a:noFill/>
+                  </a:rPr>
+                  <a:t> </a:t>
+                </a:r>
+              </a:p>
+            </p:txBody>
+          </p:sp>
+        </mc:Fallback>
+      </mc:AlternateContent>
+      <p:sp>
+        <p:nvSpPr>
+          <p:cNvPr id="3" name="Titel 2"/>
+          <p:cNvSpPr>
+            <a:spLocks noGrp="1"/>
+          </p:cNvSpPr>
+          <p:nvPr>
+            <p:ph type="title"/>
+          </p:nvPr>
+        </p:nvSpPr>
+        <p:spPr/>
+        <p:txBody>
+          <a:bodyPr/>
+          <a:lstStyle/>
+          <a:p>
+            <a:r>
+              <a:rPr lang="de-DE" dirty="0" smtClean="0"/>
+              <a:t>Maschine Learning &amp; Pattern Recognition</a:t>
+            </a:r>
+            <a:endParaRPr lang="de-DE" dirty="0"/>
+          </a:p>
+        </p:txBody>
+      </p:sp>
+    </p:spTree>
+    <p:extLst>
+      <p:ext uri="{BB962C8B-B14F-4D97-AF65-F5344CB8AC3E}">
+        <p14:creationId xmlns:p14="http://schemas.microsoft.com/office/powerpoint/2010/main" val="2850326752"/>
+      </p:ext>
+    </p:extLst>
+  </p:cSld>
+  <p:clrMapOvr>
+    <a:masterClrMapping/>
+  </p:clrMapOvr>
+  <p:timing>
+    <p:tnLst>
+      <p:par>
+        <p:cTn id="1" dur="indefinite" restart="never" nodeType="tmRoot">
+          <p:childTnLst>
+            <p:seq concurrent="1" nextAc="seek">
+              <p:cTn id="2" dur="indefinite" nodeType="mainSeq">
+                <p:childTnLst>
+                  <p:par>
+                    <p:cTn id="3" fill="hold">
+                      <p:stCondLst>
+                        <p:cond delay="indefinite"/>
+                      </p:stCondLst>
+                      <p:childTnLst>
+                        <p:par>
+                          <p:cTn id="4" fill="hold">
+                            <p:stCondLst>
+                              <p:cond delay="0"/>
+                            </p:stCondLst>
+                            <p:childTnLst>
+                              <p:par>
+                                <p:cTn id="5" presetID="1" presetClass="entr" presetSubtype="0" fill="hold" nodeType="clickEffect">
+                                  <p:stCondLst>
+                                    <p:cond delay="0"/>
+                                  </p:stCondLst>
+                                  <p:childTnLst>
+                                    <p:set>
+                                      <p:cBhvr>
+                                        <p:cTn id="6" dur="1" fill="hold">
+                                          <p:stCondLst>
+                                            <p:cond delay="0"/>
+                                          </p:stCondLst>
+                                        </p:cTn>
+                                        <p:tgtEl>
+                                          <p:spTgt spid="2">
+                                            <p:txEl>
+                                              <p:pRg st="1" end="1"/>
+                                            </p:txEl>
+                                          </p:spTgt>
+                                        </p:tgtEl>
+                                        <p:attrNameLst>
+                                          <p:attrName>style.visibility</p:attrName>
+                                        </p:attrNameLst>
+                                      </p:cBhvr>
+                                      <p:to>
+                                        <p:strVal val="visible"/>
+                                      </p:to>
+                                    </p:set>
+                                  </p:childTnLst>
+                                </p:cTn>
+                              </p:par>
+                            </p:childTnLst>
+                          </p:cTn>
+                        </p:par>
+                      </p:childTnLst>
+                    </p:cTn>
+                  </p:par>
+                  <p:par>
+                    <p:cTn id="7" fill="hold">
+                      <p:stCondLst>
+                        <p:cond delay="indefinite"/>
+                      </p:stCondLst>
+                      <p:childTnLst>
+                        <p:par>
+                          <p:cTn id="8" fill="hold">
+                            <p:stCondLst>
+                              <p:cond delay="0"/>
+                            </p:stCondLst>
+                            <p:childTnLst>
+                              <p:par>
+                                <p:cTn id="9" presetID="1" presetClass="entr" presetSubtype="0" fill="hold" nodeType="clickEffect">
+                                  <p:stCondLst>
+                                    <p:cond delay="0"/>
+                                  </p:stCondLst>
+                                  <p:childTnLst>
+                                    <p:set>
+                                      <p:cBhvr>
+                                        <p:cTn id="10" dur="1" fill="hold">
+                                          <p:stCondLst>
+                                            <p:cond delay="0"/>
+                                          </p:stCondLst>
+                                        </p:cTn>
+                                        <p:tgtEl>
+                                          <p:spTgt spid="2">
+                                            <p:txEl>
+                                              <p:pRg st="2" end="2"/>
+                                            </p:txEl>
+                                          </p:spTgt>
+                                        </p:tgtEl>
+                                        <p:attrNameLst>
+                                          <p:attrName>style.visibility</p:attrName>
+                                        </p:attrNameLst>
+                                      </p:cBhvr>
+                                      <p:to>
+                                        <p:strVal val="visible"/>
+                                      </p:to>
+                                    </p:set>
+                                  </p:childTnLst>
+                                </p:cTn>
+                              </p:par>
+                              <p:par>
+                                <p:cTn id="11" presetID="1" presetClass="entr" presetSubtype="0" fill="hold" nodeType="withEffect">
+                                  <p:stCondLst>
+                                    <p:cond delay="0"/>
+                                  </p:stCondLst>
+                                  <p:childTnLst>
+                                    <p:set>
+                                      <p:cBhvr>
+                                        <p:cTn id="12" dur="1" fill="hold">
+                                          <p:stCondLst>
+                                            <p:cond delay="0"/>
+                                          </p:stCondLst>
+                                        </p:cTn>
+                                        <p:tgtEl>
+                                          <p:spTgt spid="2">
+                                            <p:txEl>
+                                              <p:pRg st="3" end="3"/>
+                                            </p:txEl>
+                                          </p:spTgt>
+                                        </p:tgtEl>
+                                        <p:attrNameLst>
+                                          <p:attrName>style.visibility</p:attrName>
+                                        </p:attrNameLst>
+                                      </p:cBhvr>
+                                      <p:to>
+                                        <p:strVal val="visible"/>
+                                      </p:to>
+                                    </p:set>
+                                  </p:childTnLst>
+                                </p:cTn>
+                              </p:par>
+                              <p:par>
+                                <p:cTn id="13" presetID="1" presetClass="entr" presetSubtype="0" fill="hold" nodeType="withEffect">
+                                  <p:stCondLst>
+                                    <p:cond delay="0"/>
+                                  </p:stCondLst>
+                                  <p:childTnLst>
+                                    <p:set>
+                                      <p:cBhvr>
+                                        <p:cTn id="14" dur="1" fill="hold">
+                                          <p:stCondLst>
+                                            <p:cond delay="0"/>
+                                          </p:stCondLst>
+                                        </p:cTn>
+                                        <p:tgtEl>
+                                          <p:spTgt spid="2">
+                                            <p:txEl>
+                                              <p:pRg st="4" end="4"/>
+                                            </p:txEl>
+                                          </p:spTgt>
+                                        </p:tgtEl>
+                                        <p:attrNameLst>
+                                          <p:attrName>style.visibility</p:attrName>
+                                        </p:attrNameLst>
+                                      </p:cBhvr>
+                                      <p:to>
+                                        <p:strVal val="visible"/>
+                                      </p:to>
+                                    </p:set>
+                                  </p:childTnLst>
+                                </p:cTn>
+                              </p:par>
+                              <p:par>
+                                <p:cTn id="15" presetID="1" presetClass="entr" presetSubtype="0" fill="hold" nodeType="withEffect">
+                                  <p:stCondLst>
+                                    <p:cond delay="0"/>
+                                  </p:stCondLst>
+                                  <p:childTnLst>
+                                    <p:set>
+                                      <p:cBhvr>
+                                        <p:cTn id="16" dur="1" fill="hold">
+                                          <p:stCondLst>
+                                            <p:cond delay="0"/>
+                                          </p:stCondLst>
+                                        </p:cTn>
+                                        <p:tgtEl>
+                                          <p:spTgt spid="2">
+                                            <p:txEl>
+                                              <p:pRg st="5" end="5"/>
+                                            </p:txEl>
+                                          </p:spTgt>
+                                        </p:tgtEl>
+                                        <p:attrNameLst>
+                                          <p:attrName>style.visibility</p:attrName>
+                                        </p:attrNameLst>
+                                      </p:cBhvr>
+                                      <p:to>
+                                        <p:strVal val="visible"/>
+                                      </p:to>
+                                    </p:set>
+                                  </p:childTnLst>
+                                </p:cTn>
+                              </p:par>
+                              <p:par>
+                                <p:cTn id="17" presetID="1" presetClass="entr" presetSubtype="0" fill="hold" nodeType="withEffect">
+                                  <p:stCondLst>
+                                    <p:cond delay="0"/>
+                                  </p:stCondLst>
+                                  <p:childTnLst>
+                                    <p:set>
+                                      <p:cBhvr>
+                                        <p:cTn id="18" dur="1" fill="hold">
+                                          <p:stCondLst>
+                                            <p:cond delay="0"/>
+                                          </p:stCondLst>
+                                        </p:cTn>
+                                        <p:tgtEl>
+                                          <p:spTgt spid="2">
+                                            <p:txEl>
+                                              <p:pRg st="6" end="6"/>
+                                            </p:txEl>
+                                          </p:spTgt>
+                                        </p:tgtEl>
+                                        <p:attrNameLst>
+                                          <p:attrName>style.visibility</p:attrName>
+                                        </p:attrNameLst>
+                                      </p:cBhvr>
+                                      <p:to>
+                                        <p:strVal val="visible"/>
+                                      </p:to>
+                                    </p:set>
+                                  </p:childTnLst>
+                                </p:cTn>
+                              </p:par>
+                            </p:childTnLst>
+                          </p:cTn>
+                        </p:par>
+                      </p:childTnLst>
+                    </p:cTn>
+                  </p:par>
+                  <p:par>
+                    <p:cTn id="19" fill="hold">
+                      <p:stCondLst>
+                        <p:cond delay="indefinite"/>
+                      </p:stCondLst>
+                      <p:childTnLst>
+                        <p:par>
+                          <p:cTn id="20" fill="hold">
+                            <p:stCondLst>
+                              <p:cond delay="0"/>
+                            </p:stCondLst>
+                            <p:childTnLst>
+                              <p:par>
+                                <p:cTn id="21" presetID="1" presetClass="entr" presetSubtype="0" fill="hold" nodeType="clickEffect">
+                                  <p:stCondLst>
+                                    <p:cond delay="0"/>
+                                  </p:stCondLst>
+                                  <p:childTnLst>
+                                    <p:set>
+                                      <p:cBhvr>
+                                        <p:cTn id="22" dur="1" fill="hold">
+                                          <p:stCondLst>
+                                            <p:cond delay="0"/>
+                                          </p:stCondLst>
+                                        </p:cTn>
+                                        <p:tgtEl>
+                                          <p:spTgt spid="2">
+                                            <p:txEl>
+                                              <p:pRg st="8" end="8"/>
+                                            </p:txEl>
+                                          </p:spTgt>
+                                        </p:tgtEl>
+                                        <p:attrNameLst>
+                                          <p:attrName>style.visibility</p:attrName>
+                                        </p:attrNameLst>
+                                      </p:cBhvr>
+                                      <p:to>
+                                        <p:strVal val="visible"/>
+                                      </p:to>
+                                    </p:set>
+                                  </p:childTnLst>
+                                </p:cTn>
+                              </p:par>
+                              <p:par>
+                                <p:cTn id="23" presetID="1" presetClass="entr" presetSubtype="0" fill="hold" nodeType="withEffect">
+                                  <p:stCondLst>
+                                    <p:cond delay="0"/>
+                                  </p:stCondLst>
+                                  <p:childTnLst>
+                                    <p:set>
+                                      <p:cBhvr>
+                                        <p:cTn id="24" dur="1" fill="hold">
+                                          <p:stCondLst>
+                                            <p:cond delay="0"/>
+                                          </p:stCondLst>
+                                        </p:cTn>
+                                        <p:tgtEl>
+                                          <p:spTgt spid="2">
+                                            <p:txEl>
+                                              <p:pRg st="9" end="9"/>
+                                            </p:txEl>
+                                          </p:spTgt>
+                                        </p:tgtEl>
+                                        <p:attrNameLst>
+                                          <p:attrName>style.visibility</p:attrName>
+                                        </p:attrNameLst>
+                                      </p:cBhvr>
+                                      <p:to>
+                                        <p:strVal val="visible"/>
+                                      </p:to>
+                                    </p:set>
+                                  </p:childTnLst>
+                                </p:cTn>
+                              </p:par>
+                            </p:childTnLst>
+                          </p:cTn>
+                        </p:par>
+                      </p:childTnLst>
+                    </p:cTn>
+                  </p:par>
+                  <p:par>
+                    <p:cTn id="25" fill="hold">
+                      <p:stCondLst>
+                        <p:cond delay="indefinite"/>
+                      </p:stCondLst>
+                      <p:childTnLst>
+                        <p:par>
+                          <p:cTn id="26" fill="hold">
+                            <p:stCondLst>
+                              <p:cond delay="0"/>
+                            </p:stCondLst>
+                            <p:childTnLst>
+                              <p:par>
+                                <p:cTn id="27" presetID="1" presetClass="entr" presetSubtype="0" fill="hold" nodeType="clickEffect">
+                                  <p:stCondLst>
+                                    <p:cond delay="0"/>
+                                  </p:stCondLst>
+                                  <p:childTnLst>
+                                    <p:set>
+                                      <p:cBhvr>
+                                        <p:cTn id="28" dur="1" fill="hold">
+                                          <p:stCondLst>
+                                            <p:cond delay="0"/>
+                                          </p:stCondLst>
+                                        </p:cTn>
+                                        <p:tgtEl>
+                                          <p:spTgt spid="2">
+                                            <p:txEl>
+                                              <p:pRg st="10" end="10"/>
+                                            </p:txEl>
+                                          </p:spTgt>
+                                        </p:tgtEl>
+                                        <p:attrNameLst>
+                                          <p:attrName>style.visibility</p:attrName>
+                                        </p:attrNameLst>
+                                      </p:cBhvr>
+                                      <p:to>
+                                        <p:strVal val="visible"/>
+                                      </p:to>
+                                    </p:set>
+                                  </p:childTnLst>
+                                </p:cTn>
+                              </p:par>
+                            </p:childTnLst>
+                          </p:cTn>
+                        </p:par>
+                      </p:childTnLst>
+                    </p:cTn>
+                  </p:par>
+                  <p:par>
+                    <p:cTn id="29" fill="hold">
+                      <p:stCondLst>
+                        <p:cond delay="indefinite"/>
+                      </p:stCondLst>
+                      <p:childTnLst>
+                        <p:par>
+                          <p:cTn id="30" fill="hold">
+                            <p:stCondLst>
+                              <p:cond delay="0"/>
+                            </p:stCondLst>
+                            <p:childTnLst>
+                              <p:par>
+                                <p:cTn id="31" presetID="1" presetClass="entr" presetSubtype="0" fill="hold" nodeType="clickEffect">
+                                  <p:stCondLst>
+                                    <p:cond delay="0"/>
+                                  </p:stCondLst>
+                                  <p:childTnLst>
+                                    <p:set>
+                                      <p:cBhvr>
+                                        <p:cTn id="32" dur="1" fill="hold">
+                                          <p:stCondLst>
+                                            <p:cond delay="0"/>
+                                          </p:stCondLst>
+                                        </p:cTn>
+                                        <p:tgtEl>
+                                          <p:spTgt spid="2">
+                                            <p:txEl>
+                                              <p:pRg st="11" end="11"/>
+                                            </p:txEl>
+                                          </p:spTgt>
+                                        </p:tgtEl>
+                                        <p:attrNameLst>
+                                          <p:attrName>style.visibility</p:attrName>
+                                        </p:attrNameLst>
+                                      </p:cBhvr>
+                                      <p:to>
+                                        <p:strVal val="visible"/>
+                                      </p:to>
+                                    </p:set>
+                                  </p:childTnLst>
+                                </p:cTn>
+                              </p:par>
+                            </p:childTnLst>
+                          </p:cTn>
+                        </p:par>
+                      </p:childTnLst>
+                    </p:cTn>
+                  </p:par>
+                  <p:par>
+                    <p:cTn id="33" fill="hold">
+                      <p:stCondLst>
+                        <p:cond delay="indefinite"/>
+                      </p:stCondLst>
+                      <p:childTnLst>
+                        <p:par>
+                          <p:cTn id="34" fill="hold">
+                            <p:stCondLst>
+                              <p:cond delay="0"/>
+                            </p:stCondLst>
+                            <p:childTnLst>
+                              <p:par>
+                                <p:cTn id="35" presetID="1" presetClass="entr" presetSubtype="0" fill="hold" nodeType="clickEffect">
+                                  <p:stCondLst>
+                                    <p:cond delay="0"/>
+                                  </p:stCondLst>
+                                  <p:childTnLst>
+                                    <p:set>
+                                      <p:cBhvr>
+                                        <p:cTn id="36" dur="1" fill="hold">
+                                          <p:stCondLst>
+                                            <p:cond delay="0"/>
+                                          </p:stCondLst>
+                                        </p:cTn>
+                                        <p:tgtEl>
+                                          <p:spTgt spid="2">
+                                            <p:txEl>
+                                              <p:pRg st="13" end="13"/>
+                                            </p:txEl>
+                                          </p:spTgt>
+                                        </p:tgtEl>
+                                        <p:attrNameLst>
+                                          <p:attrName>style.visibility</p:attrName>
+                                        </p:attrNameLst>
+                                      </p:cBhvr>
+                                      <p:to>
+                                        <p:strVal val="visible"/>
+                                      </p:to>
+                                    </p:set>
+                                  </p:childTnLst>
+                                </p:cTn>
+                              </p:par>
+                              <p:par>
+                                <p:cTn id="37" presetID="1" presetClass="entr" presetSubtype="0" fill="hold" nodeType="withEffect">
+                                  <p:stCondLst>
+                                    <p:cond delay="0"/>
+                                  </p:stCondLst>
+                                  <p:childTnLst>
+                                    <p:set>
+                                      <p:cBhvr>
+                                        <p:cTn id="38" dur="1" fill="hold">
+                                          <p:stCondLst>
+                                            <p:cond delay="0"/>
+                                          </p:stCondLst>
+                                        </p:cTn>
+                                        <p:tgtEl>
+                                          <p:spTgt spid="2">
+                                            <p:txEl>
+                                              <p:pRg st="14" end="14"/>
+                                            </p:txEl>
+                                          </p:spTgt>
+                                        </p:tgtEl>
+                                        <p:attrNameLst>
+                                          <p:attrName>style.visibility</p:attrName>
+                                        </p:attrNameLst>
+                                      </p:cBhvr>
+                                      <p:to>
+                                        <p:strVal val="visible"/>
+                                      </p:to>
+                                    </p:set>
+                                  </p:childTnLst>
+                                </p:cTn>
+                              </p:par>
+                              <p:par>
+                                <p:cTn id="39" presetID="1" presetClass="entr" presetSubtype="0" fill="hold" nodeType="withEffect">
+                                  <p:stCondLst>
+                                    <p:cond delay="0"/>
+                                  </p:stCondLst>
+                                  <p:childTnLst>
+                                    <p:set>
+                                      <p:cBhvr>
+                                        <p:cTn id="40" dur="1" fill="hold">
+                                          <p:stCondLst>
+                                            <p:cond delay="0"/>
+                                          </p:stCondLst>
+                                        </p:cTn>
+                                        <p:tgtEl>
+                                          <p:spTgt spid="2">
+                                            <p:txEl>
+                                              <p:pRg st="15" end="15"/>
+                                            </p:txEl>
+                                          </p:spTgt>
+                                        </p:tgtEl>
+                                        <p:attrNameLst>
+                                          <p:attrName>style.visibility</p:attrName>
+                                        </p:attrNameLst>
+                                      </p:cBhvr>
+                                      <p:to>
+                                        <p:strVal val="visible"/>
+                                      </p:to>
+                                    </p:set>
+                                  </p:childTnLst>
+                                </p:cTn>
+                              </p:par>
+                            </p:childTnLst>
+                          </p:cTn>
+                        </p:par>
+                      </p:childTnLst>
+                    </p:cTn>
+                  </p:par>
+                </p:childTnLst>
+              </p:cTn>
+              <p:prevCondLst>
+                <p:cond evt="onPrev" delay="0">
+                  <p:tgtEl>
+                    <p:sldTgt/>
+                  </p:tgtEl>
+                </p:cond>
+              </p:prevCondLst>
+              <p:nextCondLst>
+                <p:cond evt="onNext" delay="0">
+                  <p:tgtEl>
+                    <p:sldTgt/>
+                  </p:tgtEl>
+                </p:cond>
+              </p:nextCondLst>
+            </p:seq>
+          </p:childTnLst>
+        </p:cTn>
+      </p:par>
+    </p:tnLst>
+  </p:timing>
+</p:sld>
+</file>
+
+<file path=ppt/slides/slide23.xml><?xml version="1.0" encoding="utf-8"?>
+<p:sld xmlns:a="http://schemas.openxmlformats.org/drawingml/2006/main" xmlns:r="http://schemas.openxmlformats.org/officeDocument/2006/relationships" xmlns:p="http://schemas.openxmlformats.org/presentationml/2006/main">
+  <p:cSld>
+    <p:spTree>
+      <p:nvGrpSpPr>
+        <p:cNvPr id="1" name=""/>
+        <p:cNvGrpSpPr/>
+        <p:nvPr/>
+      </p:nvGrpSpPr>
+      <p:grpSpPr>
+        <a:xfrm>
+          <a:off x="0" y="0"/>
+          <a:ext cx="0" cy="0"/>
+          <a:chOff x="0" y="0"/>
+          <a:chExt cx="0" cy="0"/>
+        </a:xfrm>
+      </p:grpSpPr>
+      <mc:AlternateContent xmlns:mc="http://schemas.openxmlformats.org/markup-compatibility/2006">
+        <mc:Choice xmlns:a14="http://schemas.microsoft.com/office/drawing/2010/main" Requires="a14">
+          <p:sp>
+            <p:nvSpPr>
+              <p:cNvPr id="2" name="Textplatzhalter 1"/>
+              <p:cNvSpPr>
+                <a:spLocks noGrp="1"/>
+              </p:cNvSpPr>
+              <p:nvPr>
+                <p:ph type="body" idx="1"/>
+              </p:nvPr>
+            </p:nvSpPr>
+            <p:spPr>
+              <a:xfrm>
+                <a:off x="373038" y="1052053"/>
+                <a:ext cx="11484000" cy="4778476"/>
+              </a:xfrm>
+            </p:spPr>
+            <p:txBody>
+              <a:bodyPr/>
+              <a:lstStyle/>
+              <a:p>
+                <a:pPr marL="412750" indent="-285750"/>
+                <a:r>
+                  <a:rPr lang="de-DE" dirty="0" smtClean="0">
+                    <a:sym typeface="Wingdings" panose="05000000000000000000" pitchFamily="2" charset="2"/>
+                  </a:rPr>
+                  <a:t>Was bedeutet das für uns?</a:t>
+                </a:r>
+              </a:p>
+              <a:p>
+                <a:pPr marL="412750" indent="-285750"/>
+                <a:endParaRPr lang="de-DE" dirty="0" smtClean="0">
+                  <a:sym typeface="Wingdings" panose="05000000000000000000" pitchFamily="2" charset="2"/>
+                </a:endParaRPr>
+              </a:p>
+              <a:p>
+                <a:pPr marL="869950" lvl="1" indent="-285750"/>
+                <a:r>
+                  <a:rPr lang="de-DE" dirty="0" smtClean="0">
+                    <a:sym typeface="Wingdings" panose="05000000000000000000" pitchFamily="2" charset="2"/>
+                  </a:rPr>
+                  <a:t>Auswahl geeigneter Software für Algorithmen zum Analysieren der Daten und Aufbau der Modelle (z.B.                   )</a:t>
+                </a:r>
+              </a:p>
+              <a:p>
+                <a:pPr marL="869950" lvl="1" indent="-285750"/>
+                <a:endParaRPr lang="de-DE" dirty="0" smtClean="0">
+                  <a:sym typeface="Wingdings" panose="05000000000000000000" pitchFamily="2" charset="2"/>
+                </a:endParaRPr>
+              </a:p>
+              <a:p>
+                <a:pPr marL="869950" lvl="1" indent="-285750"/>
+                <a:r>
+                  <a:rPr lang="de-DE" dirty="0" smtClean="0">
+                    <a:sym typeface="Wingdings" panose="05000000000000000000" pitchFamily="2" charset="2"/>
+                  </a:rPr>
+                  <a:t>Erzeugen von Trainingsdaten </a:t>
+                </a:r>
+                <a14:m>
+                  <m:oMath xmlns:m="http://schemas.openxmlformats.org/officeDocument/2006/math">
+                    <m:d>
+                      <m:dPr>
+                        <m:ctrlPr>
+                          <a:rPr lang="de-DE" i="1">
+                            <a:latin typeface="Cambria Math" panose="02040503050406030204" pitchFamily="18" charset="0"/>
+                          </a:rPr>
+                        </m:ctrlPr>
+                      </m:dPr>
+                      <m:e>
+                        <m:r>
+                          <a:rPr lang="de-DE" b="1" i="1">
+                            <a:latin typeface="Cambria Math" panose="02040503050406030204" pitchFamily="18" charset="0"/>
+                          </a:rPr>
+                          <m:t>𝑿</m:t>
+                        </m:r>
+                        <m:r>
+                          <a:rPr lang="de-DE" b="1" i="1">
+                            <a:latin typeface="Cambria Math" panose="02040503050406030204" pitchFamily="18" charset="0"/>
+                          </a:rPr>
+                          <m:t>,</m:t>
+                        </m:r>
+                        <m:r>
+                          <a:rPr lang="de-DE" b="1" i="1">
+                            <a:latin typeface="Cambria Math" panose="02040503050406030204" pitchFamily="18" charset="0"/>
+                          </a:rPr>
+                          <m:t>𝑻</m:t>
+                        </m:r>
+                      </m:e>
+                    </m:d>
+                  </m:oMath>
+                </a14:m>
+                <a:r>
+                  <a:rPr lang="de-DE" dirty="0" smtClean="0">
+                    <a:sym typeface="Wingdings" panose="05000000000000000000" pitchFamily="2" charset="2"/>
+                  </a:rPr>
+                  <a:t> </a:t>
+                </a:r>
+              </a:p>
+              <a:p>
+                <a:pPr marL="869950" lvl="1" indent="-285750"/>
+                <a:endParaRPr lang="de-DE" dirty="0" smtClean="0">
+                  <a:sym typeface="Wingdings" panose="05000000000000000000" pitchFamily="2" charset="2"/>
+                </a:endParaRPr>
+              </a:p>
+              <a:p>
+                <a:pPr marL="1327150" lvl="2" indent="-285750"/>
+                <a14:m>
+                  <m:oMath xmlns:m="http://schemas.openxmlformats.org/officeDocument/2006/math">
+                    <m:r>
+                      <a:rPr lang="de-DE" b="1" i="1" smtClean="0">
+                        <a:latin typeface="Cambria Math" panose="02040503050406030204" pitchFamily="18" charset="0"/>
+                      </a:rPr>
+                      <m:t>𝑿</m:t>
+                    </m:r>
+                  </m:oMath>
+                </a14:m>
+                <a:r>
+                  <a:rPr lang="de-DE" b="1" dirty="0" smtClean="0">
+                    <a:sym typeface="Wingdings" panose="05000000000000000000" pitchFamily="2" charset="2"/>
+                  </a:rPr>
+                  <a:t> </a:t>
+                </a:r>
+                <a:r>
+                  <a:rPr lang="de-DE" dirty="0" smtClean="0">
+                    <a:sym typeface="Wingdings" panose="05000000000000000000" pitchFamily="2" charset="2"/>
+                  </a:rPr>
+                  <a:t>enthält die Größen, die an der Laserharfe auch ohne Einsatz des Sensorhandschuhs gemessen werden können ( Spannungen der </a:t>
+                </a:r>
+                <a:r>
+                  <a:rPr lang="de-DE" dirty="0" err="1" smtClean="0">
+                    <a:sym typeface="Wingdings" panose="05000000000000000000" pitchFamily="2" charset="2"/>
+                  </a:rPr>
+                  <a:t>Photodioden</a:t>
+                </a:r>
+                <a:r>
+                  <a:rPr lang="de-DE" dirty="0" smtClean="0">
+                    <a:sym typeface="Wingdings" panose="05000000000000000000" pitchFamily="2" charset="2"/>
+                  </a:rPr>
+                  <a:t>?)</a:t>
+                </a:r>
+              </a:p>
+              <a:p>
+                <a:pPr marL="1327150" lvl="2" indent="-285750"/>
+                <a:endParaRPr lang="de-DE" dirty="0" smtClean="0">
+                  <a:sym typeface="Wingdings" panose="05000000000000000000" pitchFamily="2" charset="2"/>
+                </a:endParaRPr>
+              </a:p>
+              <a:p>
+                <a:pPr marL="1327150" lvl="2" indent="-285750"/>
+                <a14:m>
+                  <m:oMath xmlns:m="http://schemas.openxmlformats.org/officeDocument/2006/math">
+                    <m:r>
+                      <a:rPr lang="de-DE" b="1" i="1" smtClean="0">
+                        <a:latin typeface="Cambria Math" panose="02040503050406030204" pitchFamily="18" charset="0"/>
+                      </a:rPr>
+                      <m:t>𝑻</m:t>
+                    </m:r>
+                  </m:oMath>
+                </a14:m>
+                <a:r>
+                  <a:rPr lang="de-DE" b="1" dirty="0">
+                    <a:sym typeface="Wingdings" panose="05000000000000000000" pitchFamily="2" charset="2"/>
+                  </a:rPr>
+                  <a:t> </a:t>
+                </a:r>
+                <a:r>
+                  <a:rPr lang="de-DE" dirty="0">
+                    <a:sym typeface="Wingdings" panose="05000000000000000000" pitchFamily="2" charset="2"/>
+                  </a:rPr>
+                  <a:t>enthält </a:t>
+                </a:r>
+                <a:r>
+                  <a:rPr lang="de-DE" dirty="0" smtClean="0">
+                    <a:sym typeface="Wingdings" panose="05000000000000000000" pitchFamily="2" charset="2"/>
+                  </a:rPr>
+                  <a:t>die Lageinformationen der Hand des Spielers (bzw. diejenigen, die zuvor mit Hilfe des Sensorhandschuhs ermittelt wurden, also z.B. Höhe, Neigung, evtl. Fingerposition etc. …)</a:t>
+                </a:r>
+              </a:p>
+              <a:p>
+                <a:pPr marL="1327150" lvl="2" indent="-285750"/>
+                <a:endParaRPr lang="de-DE" dirty="0">
+                  <a:sym typeface="Wingdings" panose="05000000000000000000" pitchFamily="2" charset="2"/>
+                </a:endParaRPr>
+              </a:p>
+              <a:p>
+                <a:pPr marL="869950" lvl="1" indent="-285750"/>
+                <a:r>
+                  <a:rPr lang="de-DE" dirty="0" smtClean="0">
+                    <a:sym typeface="Wingdings" panose="05000000000000000000" pitchFamily="2" charset="2"/>
+                  </a:rPr>
+                  <a:t>Verarbeiten der Daten und Erzeugen der Modelle</a:t>
+                </a:r>
+              </a:p>
+              <a:p>
+                <a:pPr marL="1327150" lvl="2" indent="-285750"/>
+                <a:endParaRPr lang="de-DE" b="1" dirty="0">
+                  <a:sym typeface="Wingdings" panose="05000000000000000000" pitchFamily="2" charset="2"/>
+                </a:endParaRPr>
+              </a:p>
+              <a:p>
+                <a:pPr marL="869950" lvl="1" indent="-285750"/>
+                <a:r>
+                  <a:rPr lang="de-DE" dirty="0" smtClean="0">
+                    <a:sym typeface="Wingdings" panose="05000000000000000000" pitchFamily="2" charset="2"/>
+                  </a:rPr>
+                  <a:t>Testen der generierten Modelle, eventuell neue Modelle aufbauen oder neue Daten generieren</a:t>
+                </a:r>
+                <a:endParaRPr lang="de-DE" dirty="0">
+                  <a:sym typeface="Wingdings" panose="05000000000000000000" pitchFamily="2" charset="2"/>
+                </a:endParaRPr>
+              </a:p>
+            </p:txBody>
+          </p:sp>
+        </mc:Choice>
+        <mc:Fallback>
+          <p:sp>
+            <p:nvSpPr>
+              <p:cNvPr id="2" name="Textplatzhalter 1"/>
+              <p:cNvSpPr>
+                <a:spLocks noGrp="1" noRot="1" noChangeAspect="1" noMove="1" noResize="1" noEditPoints="1" noAdjustHandles="1" noChangeArrowheads="1" noChangeShapeType="1" noTextEdit="1"/>
+              </p:cNvSpPr>
+              <p:nvPr>
+                <p:ph type="body" idx="1"/>
+              </p:nvPr>
+            </p:nvSpPr>
+            <p:spPr>
+              <a:xfrm>
+                <a:off x="373038" y="1052053"/>
+                <a:ext cx="11484000" cy="4778476"/>
+              </a:xfrm>
+              <a:blipFill rotWithShape="0">
+                <a:blip r:embed="rId2"/>
+                <a:stretch>
+                  <a:fillRect r="-265"/>
+                </a:stretch>
+              </a:blipFill>
+            </p:spPr>
+            <p:txBody>
+              <a:bodyPr/>
+              <a:lstStyle/>
+              <a:p>
+                <a:r>
+                  <a:rPr lang="de-DE">
+                    <a:noFill/>
+                  </a:rPr>
+                  <a:t> </a:t>
+                </a:r>
+              </a:p>
+            </p:txBody>
+          </p:sp>
+        </mc:Fallback>
+      </mc:AlternateContent>
+      <p:sp>
+        <p:nvSpPr>
+          <p:cNvPr id="3" name="Titel 2"/>
+          <p:cNvSpPr>
+            <a:spLocks noGrp="1"/>
+          </p:cNvSpPr>
+          <p:nvPr>
+            <p:ph type="title"/>
+          </p:nvPr>
+        </p:nvSpPr>
+        <p:spPr/>
+        <p:txBody>
+          <a:bodyPr/>
+          <a:lstStyle/>
+          <a:p>
+            <a:r>
+              <a:rPr lang="de-DE" dirty="0" smtClean="0"/>
+              <a:t>Maschine Learning &amp; Pattern Recognition</a:t>
+            </a:r>
+            <a:endParaRPr lang="de-DE" dirty="0"/>
+          </a:p>
+        </p:txBody>
+      </p:sp>
+      <p:pic>
+        <p:nvPicPr>
+          <p:cNvPr id="4" name="Grafik 3"/>
+          <p:cNvPicPr>
+            <a:picLocks noChangeAspect="1"/>
+          </p:cNvPicPr>
+          <p:nvPr/>
+        </p:nvPicPr>
+        <p:blipFill>
+          <a:blip r:embed="rId3">
+            <a:extLst>
+              <a:ext uri="{28A0092B-C50C-407E-A947-70E740481C1C}">
+                <a14:useLocalDpi xmlns:a14="http://schemas.microsoft.com/office/drawing/2010/main" val="0"/>
+              </a:ext>
+            </a:extLst>
+          </a:blip>
+          <a:stretch>
+            <a:fillRect/>
+          </a:stretch>
+        </p:blipFill>
+        <p:spPr>
+          <a:xfrm>
+            <a:off x="10607039" y="952901"/>
+            <a:ext cx="1039529" cy="981777"/>
+          </a:xfrm>
+          <a:prstGeom prst="rect">
+            <a:avLst/>
+          </a:prstGeom>
+        </p:spPr>
+      </p:pic>
+      <p:sp>
+        <p:nvSpPr>
+          <p:cNvPr id="7" name="Nach links gekrümmter Pfeil 6"/>
+          <p:cNvSpPr/>
+          <p:nvPr/>
+        </p:nvSpPr>
+        <p:spPr>
+          <a:xfrm rot="10800000">
+            <a:off x="383999" y="2194560"/>
+            <a:ext cx="510139" cy="2608447"/>
+          </a:xfrm>
+          <a:prstGeom prst="curvedLeftArrow">
+            <a:avLst/>
+          </a:prstGeom>
+        </p:spPr>
+        <p:style>
+          <a:lnRef idx="2">
+            <a:schemeClr val="accent1">
+              <a:shade val="50000"/>
+            </a:schemeClr>
+          </a:lnRef>
+          <a:fillRef idx="1001">
+            <a:schemeClr val="dk2"/>
+          </a:fillRef>
+          <a:effectRef idx="0">
+            <a:schemeClr val="accent1"/>
+          </a:effectRef>
+          <a:fontRef idx="minor">
+            <a:schemeClr val="lt1"/>
+          </a:fontRef>
+        </p:style>
+        <p:txBody>
+          <a:bodyPr rtlCol="0" anchor="ctr"/>
+          <a:lstStyle/>
+          <a:p>
+            <a:pPr algn="ctr"/>
+            <a:endParaRPr lang="de-DE">
+              <a:solidFill>
+                <a:schemeClr val="tx1"/>
+              </a:solidFill>
+            </a:endParaRPr>
+          </a:p>
+        </p:txBody>
+      </p:sp>
+      <p:pic>
+        <p:nvPicPr>
+          <p:cNvPr id="8" name="Grafik 7"/>
+          <p:cNvPicPr>
+            <a:picLocks noChangeAspect="1"/>
+          </p:cNvPicPr>
+          <p:nvPr/>
+        </p:nvPicPr>
+        <p:blipFill>
+          <a:blip r:embed="rId4">
+            <a:extLst>
+              <a:ext uri="{28A0092B-C50C-407E-A947-70E740481C1C}">
+                <a14:useLocalDpi xmlns:a14="http://schemas.microsoft.com/office/drawing/2010/main" val="0"/>
+              </a:ext>
+            </a:extLst>
+          </a:blip>
+          <a:stretch>
+            <a:fillRect/>
+          </a:stretch>
+        </p:blipFill>
+        <p:spPr>
+          <a:xfrm>
+            <a:off x="2308246" y="952901"/>
+            <a:ext cx="7613583" cy="4575777"/>
+          </a:xfrm>
+          <a:prstGeom prst="rect">
+            <a:avLst/>
+          </a:prstGeom>
+        </p:spPr>
+      </p:pic>
+    </p:spTree>
+    <p:extLst>
+      <p:ext uri="{BB962C8B-B14F-4D97-AF65-F5344CB8AC3E}">
+        <p14:creationId xmlns:p14="http://schemas.microsoft.com/office/powerpoint/2010/main" val="1674074651"/>
+      </p:ext>
+    </p:extLst>
+  </p:cSld>
+  <p:clrMapOvr>
+    <a:masterClrMapping/>
+  </p:clrMapOvr>
+  <p:timing>
+    <p:tnLst>
+      <p:par>
+        <p:cTn id="1" dur="indefinite" restart="never" nodeType="tmRoot">
+          <p:childTnLst>
+            <p:seq concurrent="1" nextAc="seek">
+              <p:cTn id="2" dur="indefinite" nodeType="mainSeq">
+                <p:childTnLst>
+                  <p:par>
+                    <p:cTn id="3" fill="hold">
+                      <p:stCondLst>
+                        <p:cond delay="indefinite"/>
+                      </p:stCondLst>
+                      <p:childTnLst>
+                        <p:par>
+                          <p:cTn id="4" fill="hold">
+                            <p:stCondLst>
+                              <p:cond delay="0"/>
+                            </p:stCondLst>
+                            <p:childTnLst>
+                              <p:par>
+                                <p:cTn id="5" presetID="1" presetClass="entr" presetSubtype="0" fill="hold" nodeType="clickEffect">
+                                  <p:stCondLst>
+                                    <p:cond delay="0"/>
+                                  </p:stCondLst>
+                                  <p:childTnLst>
+                                    <p:set>
+                                      <p:cBhvr>
+                                        <p:cTn id="6" dur="1" fill="hold">
+                                          <p:stCondLst>
+                                            <p:cond delay="0"/>
+                                          </p:stCondLst>
+                                        </p:cTn>
+                                        <p:tgtEl>
+                                          <p:spTgt spid="2">
+                                            <p:txEl>
+                                              <p:pRg st="2" end="2"/>
+                                            </p:txEl>
+                                          </p:spTgt>
+                                        </p:tgtEl>
+                                        <p:attrNameLst>
+                                          <p:attrName>style.visibility</p:attrName>
+                                        </p:attrNameLst>
+                                      </p:cBhvr>
+                                      <p:to>
+                                        <p:strVal val="visible"/>
+                                      </p:to>
+                                    </p:set>
+                                  </p:childTnLst>
+                                </p:cTn>
+                              </p:par>
+                              <p:par>
+                                <p:cTn id="7" presetID="1" presetClass="entr" presetSubtype="0" fill="hold" nodeType="withEffect">
+                                  <p:stCondLst>
+                                    <p:cond delay="0"/>
+                                  </p:stCondLst>
+                                  <p:childTnLst>
+                                    <p:set>
+                                      <p:cBhvr>
+                                        <p:cTn id="8" dur="1" fill="hold">
+                                          <p:stCondLst>
+                                            <p:cond delay="0"/>
+                                          </p:stCondLst>
+                                        </p:cTn>
+                                        <p:tgtEl>
+                                          <p:spTgt spid="4"/>
+                                        </p:tgtEl>
+                                        <p:attrNameLst>
+                                          <p:attrName>style.visibility</p:attrName>
+                                        </p:attrNameLst>
+                                      </p:cBhvr>
+                                      <p:to>
+                                        <p:strVal val="visible"/>
+                                      </p:to>
+                                    </p:set>
+                                  </p:childTnLst>
+                                </p:cTn>
+                              </p:par>
+                            </p:childTnLst>
+                          </p:cTn>
+                        </p:par>
+                      </p:childTnLst>
+                    </p:cTn>
+                  </p:par>
+                  <p:par>
+                    <p:cTn id="9" fill="hold">
+                      <p:stCondLst>
+                        <p:cond delay="indefinite"/>
+                      </p:stCondLst>
+                      <p:childTnLst>
+                        <p:par>
+                          <p:cTn id="10" fill="hold">
+                            <p:stCondLst>
+                              <p:cond delay="0"/>
+                            </p:stCondLst>
+                            <p:childTnLst>
+                              <p:par>
+                                <p:cTn id="11" presetID="1" presetClass="entr" presetSubtype="0" fill="hold" nodeType="clickEffect">
+                                  <p:stCondLst>
+                                    <p:cond delay="0"/>
+                                  </p:stCondLst>
+                                  <p:childTnLst>
+                                    <p:set>
+                                      <p:cBhvr>
+                                        <p:cTn id="12" dur="1" fill="hold">
+                                          <p:stCondLst>
+                                            <p:cond delay="0"/>
+                                          </p:stCondLst>
+                                        </p:cTn>
+                                        <p:tgtEl>
+                                          <p:spTgt spid="2">
+                                            <p:txEl>
+                                              <p:pRg st="4" end="4"/>
+                                            </p:txEl>
+                                          </p:spTgt>
+                                        </p:tgtEl>
+                                        <p:attrNameLst>
+                                          <p:attrName>style.visibility</p:attrName>
+                                        </p:attrNameLst>
+                                      </p:cBhvr>
+                                      <p:to>
+                                        <p:strVal val="visible"/>
+                                      </p:to>
+                                    </p:set>
+                                  </p:childTnLst>
+                                </p:cTn>
+                              </p:par>
+                            </p:childTnLst>
+                          </p:cTn>
+                        </p:par>
+                      </p:childTnLst>
+                    </p:cTn>
+                  </p:par>
+                  <p:par>
+                    <p:cTn id="13" fill="hold">
+                      <p:stCondLst>
+                        <p:cond delay="indefinite"/>
+                      </p:stCondLst>
+                      <p:childTnLst>
+                        <p:par>
+                          <p:cTn id="14" fill="hold">
+                            <p:stCondLst>
+                              <p:cond delay="0"/>
+                            </p:stCondLst>
+                            <p:childTnLst>
+                              <p:par>
+                                <p:cTn id="15" presetID="1" presetClass="entr" presetSubtype="0" fill="hold" nodeType="clickEffect">
+                                  <p:stCondLst>
+                                    <p:cond delay="0"/>
+                                  </p:stCondLst>
+                                  <p:childTnLst>
+                                    <p:set>
+                                      <p:cBhvr>
+                                        <p:cTn id="16" dur="1" fill="hold">
+                                          <p:stCondLst>
+                                            <p:cond delay="0"/>
+                                          </p:stCondLst>
+                                        </p:cTn>
+                                        <p:tgtEl>
+                                          <p:spTgt spid="2">
+                                            <p:txEl>
+                                              <p:pRg st="6" end="6"/>
+                                            </p:txEl>
+                                          </p:spTgt>
+                                        </p:tgtEl>
+                                        <p:attrNameLst>
+                                          <p:attrName>style.visibility</p:attrName>
+                                        </p:attrNameLst>
+                                      </p:cBhvr>
+                                      <p:to>
+                                        <p:strVal val="visible"/>
+                                      </p:to>
+                                    </p:set>
+                                  </p:childTnLst>
+                                </p:cTn>
+                              </p:par>
+                            </p:childTnLst>
+                          </p:cTn>
+                        </p:par>
+                      </p:childTnLst>
+                    </p:cTn>
+                  </p:par>
+                  <p:par>
+                    <p:cTn id="17" fill="hold">
+                      <p:stCondLst>
+                        <p:cond delay="indefinite"/>
+                      </p:stCondLst>
+                      <p:childTnLst>
+                        <p:par>
+                          <p:cTn id="18" fill="hold">
+                            <p:stCondLst>
+                              <p:cond delay="0"/>
+                            </p:stCondLst>
+                            <p:childTnLst>
+                              <p:par>
+                                <p:cTn id="19" presetID="1" presetClass="entr" presetSubtype="0" fill="hold" nodeType="clickEffect">
+                                  <p:stCondLst>
+                                    <p:cond delay="0"/>
+                                  </p:stCondLst>
+                                  <p:childTnLst>
+                                    <p:set>
+                                      <p:cBhvr>
+                                        <p:cTn id="20" dur="1" fill="hold">
+                                          <p:stCondLst>
+                                            <p:cond delay="0"/>
+                                          </p:stCondLst>
+                                        </p:cTn>
+                                        <p:tgtEl>
+                                          <p:spTgt spid="2">
+                                            <p:txEl>
+                                              <p:pRg st="8" end="8"/>
+                                            </p:txEl>
+                                          </p:spTgt>
+                                        </p:tgtEl>
+                                        <p:attrNameLst>
+                                          <p:attrName>style.visibility</p:attrName>
+                                        </p:attrNameLst>
+                                      </p:cBhvr>
+                                      <p:to>
+                                        <p:strVal val="visible"/>
+                                      </p:to>
+                                    </p:set>
+                                  </p:childTnLst>
+                                </p:cTn>
+                              </p:par>
+                            </p:childTnLst>
+                          </p:cTn>
+                        </p:par>
+                      </p:childTnLst>
+                    </p:cTn>
+                  </p:par>
+                  <p:par>
+                    <p:cTn id="21" fill="hold">
+                      <p:stCondLst>
+                        <p:cond delay="indefinite"/>
+                      </p:stCondLst>
+                      <p:childTnLst>
+                        <p:par>
+                          <p:cTn id="22" fill="hold">
+                            <p:stCondLst>
+                              <p:cond delay="0"/>
+                            </p:stCondLst>
+                            <p:childTnLst>
+                              <p:par>
+                                <p:cTn id="23" presetID="1" presetClass="entr" presetSubtype="0" fill="hold" nodeType="clickEffect">
+                                  <p:stCondLst>
+                                    <p:cond delay="0"/>
+                                  </p:stCondLst>
+                                  <p:childTnLst>
+                                    <p:set>
+                                      <p:cBhvr>
+                                        <p:cTn id="24" dur="1" fill="hold">
+                                          <p:stCondLst>
+                                            <p:cond delay="0"/>
+                                          </p:stCondLst>
+                                        </p:cTn>
+                                        <p:tgtEl>
+                                          <p:spTgt spid="2">
+                                            <p:txEl>
+                                              <p:pRg st="10" end="10"/>
+                                            </p:txEl>
+                                          </p:spTgt>
+                                        </p:tgtEl>
+                                        <p:attrNameLst>
+                                          <p:attrName>style.visibility</p:attrName>
+                                        </p:attrNameLst>
+                                      </p:cBhvr>
+                                      <p:to>
+                                        <p:strVal val="visible"/>
+                                      </p:to>
+                                    </p:set>
+                                  </p:childTnLst>
+                                </p:cTn>
+                              </p:par>
+                            </p:childTnLst>
+                          </p:cTn>
+                        </p:par>
+                      </p:childTnLst>
+                    </p:cTn>
+                  </p:par>
+                  <p:par>
+                    <p:cTn id="25" fill="hold">
+                      <p:stCondLst>
+                        <p:cond delay="indefinite"/>
+                      </p:stCondLst>
+                      <p:childTnLst>
+                        <p:par>
+                          <p:cTn id="26" fill="hold">
+                            <p:stCondLst>
+                              <p:cond delay="0"/>
+                            </p:stCondLst>
+                            <p:childTnLst>
+                              <p:par>
+                                <p:cTn id="27" presetID="1" presetClass="entr" presetSubtype="0" fill="hold" nodeType="clickEffect">
+                                  <p:stCondLst>
+                                    <p:cond delay="0"/>
+                                  </p:stCondLst>
+                                  <p:childTnLst>
+                                    <p:set>
+                                      <p:cBhvr>
+                                        <p:cTn id="28" dur="1" fill="hold">
+                                          <p:stCondLst>
+                                            <p:cond delay="0"/>
+                                          </p:stCondLst>
+                                        </p:cTn>
+                                        <p:tgtEl>
+                                          <p:spTgt spid="2">
+                                            <p:txEl>
+                                              <p:pRg st="12" end="12"/>
+                                            </p:txEl>
+                                          </p:spTgt>
+                                        </p:tgtEl>
+                                        <p:attrNameLst>
+                                          <p:attrName>style.visibility</p:attrName>
+                                        </p:attrNameLst>
+                                      </p:cBhvr>
+                                      <p:to>
+                                        <p:strVal val="visible"/>
+                                      </p:to>
+                                    </p:set>
+                                  </p:childTnLst>
+                                </p:cTn>
+                              </p:par>
+                            </p:childTnLst>
+                          </p:cTn>
+                        </p:par>
+                      </p:childTnLst>
+                    </p:cTn>
+                  </p:par>
+                  <p:par>
+                    <p:cTn id="29" fill="hold">
+                      <p:stCondLst>
+                        <p:cond delay="indefinite"/>
+                      </p:stCondLst>
+                      <p:childTnLst>
+                        <p:par>
+                          <p:cTn id="30" fill="hold">
+                            <p:stCondLst>
+                              <p:cond delay="0"/>
+                            </p:stCondLst>
+                            <p:childTnLst>
+                              <p:par>
+                                <p:cTn id="31" presetID="22" presetClass="entr" presetSubtype="4" fill="hold" grpId="0" nodeType="clickEffect">
+                                  <p:stCondLst>
+                                    <p:cond delay="0"/>
+                                  </p:stCondLst>
+                                  <p:childTnLst>
+                                    <p:set>
+                                      <p:cBhvr>
+                                        <p:cTn id="32" dur="1" fill="hold">
+                                          <p:stCondLst>
+                                            <p:cond delay="0"/>
+                                          </p:stCondLst>
+                                        </p:cTn>
+                                        <p:tgtEl>
+                                          <p:spTgt spid="7"/>
+                                        </p:tgtEl>
+                                        <p:attrNameLst>
+                                          <p:attrName>style.visibility</p:attrName>
+                                        </p:attrNameLst>
+                                      </p:cBhvr>
+                                      <p:to>
+                                        <p:strVal val="visible"/>
+                                      </p:to>
+                                    </p:set>
+                                    <p:animEffect transition="in" filter="wipe(down)">
+                                      <p:cBhvr>
+                                        <p:cTn id="33" dur="500"/>
+                                        <p:tgtEl>
+                                          <p:spTgt spid="7"/>
+                                        </p:tgtEl>
+                                      </p:cBhvr>
+                                    </p:animEffect>
+                                  </p:childTnLst>
+                                </p:cTn>
+                              </p:par>
+                            </p:childTnLst>
+                          </p:cTn>
+                        </p:par>
+                      </p:childTnLst>
+                    </p:cTn>
+                  </p:par>
+                  <p:par>
+                    <p:cTn id="34" fill="hold">
+                      <p:stCondLst>
+                        <p:cond delay="indefinite"/>
+                      </p:stCondLst>
+                      <p:childTnLst>
+                        <p:par>
+                          <p:cTn id="35" fill="hold">
+                            <p:stCondLst>
+                              <p:cond delay="0"/>
+                            </p:stCondLst>
+                            <p:childTnLst>
+                              <p:par>
+                                <p:cTn id="36" presetID="53" presetClass="entr" presetSubtype="16" fill="hold" nodeType="clickEffect">
+                                  <p:stCondLst>
+                                    <p:cond delay="0"/>
+                                  </p:stCondLst>
+                                  <p:childTnLst>
+                                    <p:set>
+                                      <p:cBhvr>
+                                        <p:cTn id="37" dur="1" fill="hold">
+                                          <p:stCondLst>
+                                            <p:cond delay="0"/>
+                                          </p:stCondLst>
+                                        </p:cTn>
+                                        <p:tgtEl>
+                                          <p:spTgt spid="8"/>
+                                        </p:tgtEl>
+                                        <p:attrNameLst>
+                                          <p:attrName>style.visibility</p:attrName>
+                                        </p:attrNameLst>
+                                      </p:cBhvr>
+                                      <p:to>
+                                        <p:strVal val="visible"/>
+                                      </p:to>
+                                    </p:set>
+                                    <p:anim calcmode="lin" valueType="num">
+                                      <p:cBhvr>
+                                        <p:cTn id="38" dur="500" fill="hold"/>
+                                        <p:tgtEl>
+                                          <p:spTgt spid="8"/>
+                                        </p:tgtEl>
+                                        <p:attrNameLst>
+                                          <p:attrName>ppt_w</p:attrName>
+                                        </p:attrNameLst>
+                                      </p:cBhvr>
+                                      <p:tavLst>
+                                        <p:tav tm="0">
+                                          <p:val>
+                                            <p:fltVal val="0"/>
+                                          </p:val>
+                                        </p:tav>
+                                        <p:tav tm="100000">
+                                          <p:val>
+                                            <p:strVal val="#ppt_w"/>
+                                          </p:val>
+                                        </p:tav>
+                                      </p:tavLst>
+                                    </p:anim>
+                                    <p:anim calcmode="lin" valueType="num">
+                                      <p:cBhvr>
+                                        <p:cTn id="39" dur="500" fill="hold"/>
+                                        <p:tgtEl>
+                                          <p:spTgt spid="8"/>
+                                        </p:tgtEl>
+                                        <p:attrNameLst>
+                                          <p:attrName>ppt_h</p:attrName>
+                                        </p:attrNameLst>
+                                      </p:cBhvr>
+                                      <p:tavLst>
+                                        <p:tav tm="0">
+                                          <p:val>
+                                            <p:fltVal val="0"/>
+                                          </p:val>
+                                        </p:tav>
+                                        <p:tav tm="100000">
+                                          <p:val>
+                                            <p:strVal val="#ppt_h"/>
+                                          </p:val>
+                                        </p:tav>
+                                      </p:tavLst>
+                                    </p:anim>
+                                    <p:animEffect transition="in" filter="fade">
+                                      <p:cBhvr>
+                                        <p:cTn id="40" dur="500"/>
+                                        <p:tgtEl>
+                                          <p:spTgt spid="8"/>
+                                        </p:tgtEl>
+                                      </p:cBhvr>
+                                    </p:animEffect>
+                                  </p:childTnLst>
+                                </p:cTn>
+                              </p:par>
+                            </p:childTnLst>
+                          </p:cTn>
+                        </p:par>
+                      </p:childTnLst>
+                    </p:cTn>
+                  </p:par>
+                </p:childTnLst>
+              </p:cTn>
+              <p:prevCondLst>
+                <p:cond evt="onPrev" delay="0">
+                  <p:tgtEl>
+                    <p:sldTgt/>
+                  </p:tgtEl>
+                </p:cond>
+              </p:prevCondLst>
+              <p:nextCondLst>
+                <p:cond evt="onNext" delay="0">
+                  <p:tgtEl>
+                    <p:sldTgt/>
+                  </p:tgtEl>
+                </p:cond>
+              </p:nextCondLst>
+            </p:seq>
+          </p:childTnLst>
+        </p:cTn>
+      </p:par>
+    </p:tnLst>
+    <p:bldLst>
+      <p:bldP spid="7" grpId="0" animBg="1"/>
+    </p:bldLst>
+  </p:timing>
+</p:sld>
+</file>
+
+<file path=ppt/slides/slide24.xml><?xml version="1.0" encoding="utf-8"?>
+<p:sld xmlns:a="http://schemas.openxmlformats.org/drawingml/2006/main" xmlns:r="http://schemas.openxmlformats.org/officeDocument/2006/relationships" xmlns:p="http://schemas.openxmlformats.org/presentationml/2006/main">
+  <p:cSld>
+    <p:spTree>
+      <p:nvGrpSpPr>
+        <p:cNvPr id="1" name=""/>
+        <p:cNvGrpSpPr/>
+        <p:nvPr/>
+      </p:nvGrpSpPr>
+      <p:grpSpPr>
+        <a:xfrm>
+          <a:off x="0" y="0"/>
+          <a:ext cx="0" cy="0"/>
+          <a:chOff x="0" y="0"/>
+          <a:chExt cx="0" cy="0"/>
+        </a:xfrm>
+      </p:grpSpPr>
+      <p:sp>
+        <p:nvSpPr>
+          <p:cNvPr id="2" name="Textplatzhalter 1"/>
+          <p:cNvSpPr>
+            <a:spLocks noGrp="1"/>
+          </p:cNvSpPr>
+          <p:nvPr>
+            <p:ph type="body" idx="1"/>
+          </p:nvPr>
+        </p:nvSpPr>
+        <p:spPr>
+          <a:xfrm>
+            <a:off x="373038" y="1022555"/>
+            <a:ext cx="11484000" cy="3855445"/>
+          </a:xfrm>
+        </p:spPr>
+        <p:txBody>
+          <a:bodyPr/>
+          <a:lstStyle/>
+          <a:p>
+            <a:pPr marL="571500" indent="-457200">
+              <a:buFont typeface="+mj-lt"/>
+              <a:buAutoNum type="arabicParenBoth"/>
+            </a:pPr>
+            <a:r>
+              <a:rPr lang="de-DE" sz="2000" b="1" dirty="0" smtClean="0">
+                <a:solidFill>
+                  <a:schemeClr val="tx1"/>
+                </a:solidFill>
+              </a:rPr>
+              <a:t>Stand der Technik</a:t>
+            </a:r>
+          </a:p>
+          <a:p>
+            <a:pPr marL="1028700" lvl="1" indent="-457200"/>
+            <a:r>
+              <a:rPr lang="de-DE" b="1" dirty="0" smtClean="0">
+                <a:solidFill>
+                  <a:schemeClr val="tx1"/>
+                </a:solidFill>
+              </a:rPr>
+              <a:t>Konstruktion</a:t>
+            </a:r>
+          </a:p>
+          <a:p>
+            <a:pPr marL="1028700" lvl="1" indent="-457200"/>
+            <a:r>
+              <a:rPr lang="de-DE" b="1" dirty="0" smtClean="0">
+                <a:solidFill>
+                  <a:schemeClr val="tx1"/>
+                </a:solidFill>
+              </a:rPr>
+              <a:t>Software</a:t>
+            </a:r>
+          </a:p>
+          <a:p>
+            <a:pPr marL="571500" indent="-457200">
+              <a:buFont typeface="+mj-lt"/>
+              <a:buAutoNum type="arabicParenBoth"/>
+            </a:pPr>
+            <a:r>
+              <a:rPr lang="de-DE" sz="2000" b="1" dirty="0" smtClean="0">
+                <a:solidFill>
+                  <a:schemeClr val="tx1"/>
+                </a:solidFill>
+              </a:rPr>
+              <a:t> Zeitplan</a:t>
+            </a:r>
+          </a:p>
+          <a:p>
+            <a:pPr marL="571500" indent="-457200">
+              <a:buFont typeface="+mj-lt"/>
+              <a:buAutoNum type="arabicParenBoth"/>
+            </a:pPr>
+            <a:r>
+              <a:rPr lang="de-DE" sz="2000" b="1" dirty="0" smtClean="0">
+                <a:solidFill>
+                  <a:schemeClr val="accent6">
+                    <a:lumMod val="60000"/>
+                    <a:lumOff val="40000"/>
+                  </a:schemeClr>
+                </a:solidFill>
+              </a:rPr>
+              <a:t> </a:t>
+            </a:r>
+            <a:r>
+              <a:rPr lang="de-DE" sz="2000" b="1" dirty="0" smtClean="0">
+                <a:solidFill>
+                  <a:schemeClr val="tx1"/>
+                </a:solidFill>
+              </a:rPr>
+              <a:t>I^2C Bus und </a:t>
+            </a:r>
+            <a:r>
+              <a:rPr lang="de-DE" sz="2000" b="1" dirty="0" smtClean="0">
+                <a:solidFill>
+                  <a:schemeClr val="tx1"/>
+                </a:solidFill>
+              </a:rPr>
+              <a:t>Multiplexer</a:t>
+            </a:r>
+          </a:p>
+          <a:p>
+            <a:pPr marL="571500" indent="-457200">
+              <a:buFont typeface="+mj-lt"/>
+              <a:buAutoNum type="arabicParenBoth"/>
+            </a:pPr>
+            <a:r>
+              <a:rPr lang="de-DE" sz="2000" b="1" dirty="0">
+                <a:solidFill>
+                  <a:schemeClr val="tx1"/>
+                </a:solidFill>
+              </a:rPr>
+              <a:t>Maschine Learning &amp; Pattern Recognition</a:t>
+            </a:r>
+          </a:p>
+          <a:p>
+            <a:pPr marL="571500" indent="-457200">
+              <a:buFont typeface="+mj-lt"/>
+              <a:buAutoNum type="arabicParenBoth"/>
+            </a:pPr>
+            <a:r>
+              <a:rPr lang="de-DE" sz="2000" b="1" dirty="0" smtClean="0">
+                <a:solidFill>
+                  <a:schemeClr val="accent6">
+                    <a:lumMod val="60000"/>
+                    <a:lumOff val="40000"/>
+                  </a:schemeClr>
+                </a:solidFill>
+              </a:rPr>
+              <a:t>Nächste </a:t>
+            </a:r>
+            <a:r>
+              <a:rPr lang="de-DE" sz="2000" b="1" dirty="0" smtClean="0">
+                <a:solidFill>
+                  <a:schemeClr val="accent6">
+                    <a:lumMod val="60000"/>
+                    <a:lumOff val="40000"/>
+                  </a:schemeClr>
+                </a:solidFill>
+              </a:rPr>
+              <a:t>Schritte</a:t>
+            </a:r>
+          </a:p>
+          <a:p>
+            <a:pPr>
+              <a:buNone/>
+            </a:pPr>
+            <a:endParaRPr lang="de-DE" dirty="0"/>
+          </a:p>
+        </p:txBody>
+      </p:sp>
+      <p:sp>
+        <p:nvSpPr>
+          <p:cNvPr id="3" name="Titel 2"/>
+          <p:cNvSpPr>
+            <a:spLocks noGrp="1"/>
+          </p:cNvSpPr>
+          <p:nvPr>
+            <p:ph type="title"/>
+          </p:nvPr>
+        </p:nvSpPr>
+        <p:spPr/>
+        <p:txBody>
+          <a:bodyPr/>
+          <a:lstStyle/>
+          <a:p>
+            <a:r>
+              <a:rPr lang="de-DE" dirty="0" smtClean="0"/>
+              <a:t>Inhaltsverzeichnis</a:t>
+            </a:r>
+            <a:endParaRPr lang="de-DE" dirty="0"/>
+          </a:p>
+        </p:txBody>
+      </p:sp>
+    </p:spTree>
+    <p:extLst>
+      <p:ext uri="{BB962C8B-B14F-4D97-AF65-F5344CB8AC3E}">
+        <p14:creationId xmlns:p14="http://schemas.microsoft.com/office/powerpoint/2010/main" val="1704821266"/>
+      </p:ext>
+    </p:extLst>
+  </p:cSld>
+  <p:clrMapOvr>
+    <a:masterClrMapping/>
+  </p:clrMapOvr>
+  <p:timing>
+    <p:tnLst>
+      <p:par>
+        <p:cTn id="1" dur="indefinite" restart="never" nodeType="tmRoot"/>
+      </p:par>
+    </p:tnLst>
+  </p:timing>
+</p:sld>
+</file>
+
+<file path=ppt/slides/slide25.xml><?xml version="1.0" encoding="utf-8"?>
 <p:sld xmlns:a="http://schemas.openxmlformats.org/drawingml/2006/main" xmlns:r="http://schemas.openxmlformats.org/officeDocument/2006/relationships" xmlns:p="http://schemas.openxmlformats.org/presentationml/2006/main">
   <p:cSld>
     <p:spTree>
@@ -11308,10 +14945,17 @@
   <p:clrMapOvr>
     <a:masterClrMapping/>
   </p:clrMapOvr>
+  <p:timing>
+    <p:tnLst>
+      <p:par>
+        <p:cTn id="1" dur="indefinite" restart="never" nodeType="tmRoot"/>
+      </p:par>
+    </p:tnLst>
+  </p:timing>
 </p:sld>
 </file>
 
-<file path=ppt/slides/slide22.xml><?xml version="1.0" encoding="utf-8"?>
+<file path=ppt/slides/slide26.xml><?xml version="1.0" encoding="utf-8"?>
 <p:sld xmlns:a="http://schemas.openxmlformats.org/drawingml/2006/main" xmlns:r="http://schemas.openxmlformats.org/officeDocument/2006/relationships" xmlns:p="http://schemas.openxmlformats.org/presentationml/2006/main">
   <p:cSld>
     <p:spTree>
@@ -13298,7 +16942,7 @@
     </p:spTree>
     <p:extLst>
       <p:ext uri="{BB962C8B-B14F-4D97-AF65-F5344CB8AC3E}">
-        <p14:creationId xmlns="" xmlns:p14="http://schemas.microsoft.com/office/powerpoint/2010/main" val="4006514606"/>
+        <p14:creationId xmlns:p14="http://schemas.microsoft.com/office/powerpoint/2010/main" val="4006514606"/>
       </p:ext>
     </p:extLst>
   </p:cSld>
@@ -15439,12 +19083,34 @@
               <a:buAutoNum type="arabicParenBoth"/>
             </a:pPr>
             <a:r>
+              <a:rPr lang="de-DE" sz="2000" b="1" dirty="0">
+                <a:solidFill>
+                  <a:schemeClr val="tx1"/>
+                </a:solidFill>
+              </a:rPr>
+              <a:t>Maschine Learning &amp; Pattern Recognition</a:t>
+            </a:r>
+          </a:p>
+          <a:p>
+            <a:pPr marL="571500" indent="-457200">
+              <a:buFont typeface="+mj-lt"/>
+              <a:buAutoNum type="arabicParenBoth"/>
+            </a:pPr>
+            <a:r>
               <a:rPr lang="de-DE" sz="2000" b="1" dirty="0" smtClean="0">
                 <a:solidFill>
                   <a:schemeClr val="tx1"/>
                 </a:solidFill>
               </a:rPr>
-              <a:t>Nächste Schritte</a:t>
+              <a:t>Nächste </a:t>
+            </a:r>
+            <a:r>
+              <a:rPr lang="de-DE" sz="2000" b="1" dirty="0" smtClean="0">
+                <a:solidFill>
+                  <a:schemeClr val="tx1"/>
+                </a:solidFill>
+              </a:rPr>
+              <a:t>Schritte</a:t>
             </a:r>
           </a:p>
           <a:p>
@@ -15494,6 +19160,13 @@
   <p:clrMapOvr>
     <a:masterClrMapping/>
   </p:clrMapOvr>
+  <p:timing>
+    <p:tnLst>
+      <p:par>
+        <p:cTn id="1" dur="indefinite" restart="never" nodeType="tmRoot"/>
+      </p:par>
+    </p:tnLst>
+  </p:timing>
 </p:sld>
 </file>
 
@@ -15552,7 +19225,7 @@
           <a:blip r:embed="rId2" cstate="email">
             <a:extLst>
               <a:ext uri="{28A0092B-C50C-407E-A947-70E740481C1C}">
-                <a14:useLocalDpi xmlns:a14="http://schemas.microsoft.com/office/drawing/2010/main" xmlns="" val="0"/>
+                <a14:useLocalDpi xmlns:a14="http://schemas.microsoft.com/office/drawing/2010/main" val="0"/>
               </a:ext>
             </a:extLst>
           </a:blip>
@@ -15572,7 +19245,7 @@
     </p:spTree>
     <p:extLst>
       <p:ext uri="{BB962C8B-B14F-4D97-AF65-F5344CB8AC3E}">
-        <p14:creationId xmlns:p14="http://schemas.microsoft.com/office/powerpoint/2010/main" xmlns="" val="3008181596"/>
+        <p14:creationId xmlns:p14="http://schemas.microsoft.com/office/powerpoint/2010/main" val="3008181596"/>
       </p:ext>
     </p:extLst>
   </p:cSld>
@@ -15649,7 +19322,7 @@
           <a:blip r:embed="rId2" cstate="email">
             <a:extLst>
               <a:ext uri="{28A0092B-C50C-407E-A947-70E740481C1C}">
-                <a14:useLocalDpi xmlns:a14="http://schemas.microsoft.com/office/drawing/2010/main" xmlns="" val="0"/>
+                <a14:useLocalDpi xmlns:a14="http://schemas.microsoft.com/office/drawing/2010/main" val="0"/>
               </a:ext>
             </a:extLst>
           </a:blip>
@@ -15678,7 +19351,7 @@
           <a:blip r:embed="rId3" cstate="email">
             <a:extLst>
               <a:ext uri="{28A0092B-C50C-407E-A947-70E740481C1C}">
-                <a14:useLocalDpi xmlns:a14="http://schemas.microsoft.com/office/drawing/2010/main" xmlns="" val="0"/>
+                <a14:useLocalDpi xmlns:a14="http://schemas.microsoft.com/office/drawing/2010/main" val="0"/>
               </a:ext>
             </a:extLst>
           </a:blip>
@@ -15707,7 +19380,7 @@
           <a:blip r:embed="rId4" cstate="email">
             <a:extLst>
               <a:ext uri="{28A0092B-C50C-407E-A947-70E740481C1C}">
-                <a14:useLocalDpi xmlns:a14="http://schemas.microsoft.com/office/drawing/2010/main" xmlns="" val="0"/>
+                <a14:useLocalDpi xmlns:a14="http://schemas.microsoft.com/office/drawing/2010/main" val="0"/>
               </a:ext>
             </a:extLst>
           </a:blip>
@@ -15736,7 +19409,7 @@
           <a:blip r:embed="rId5" cstate="email">
             <a:extLst>
               <a:ext uri="{28A0092B-C50C-407E-A947-70E740481C1C}">
-                <a14:useLocalDpi xmlns:a14="http://schemas.microsoft.com/office/drawing/2010/main" xmlns="" val="0"/>
+                <a14:useLocalDpi xmlns:a14="http://schemas.microsoft.com/office/drawing/2010/main" val="0"/>
               </a:ext>
             </a:extLst>
           </a:blip>
@@ -15765,7 +19438,7 @@
           <a:blip r:embed="rId6" cstate="email">
             <a:extLst>
               <a:ext uri="{28A0092B-C50C-407E-A947-70E740481C1C}">
-                <a14:useLocalDpi xmlns:a14="http://schemas.microsoft.com/office/drawing/2010/main" xmlns="" val="0"/>
+                <a14:useLocalDpi xmlns:a14="http://schemas.microsoft.com/office/drawing/2010/main" val="0"/>
               </a:ext>
             </a:extLst>
           </a:blip>
@@ -16200,7 +19873,7 @@
     </p:spTree>
     <p:extLst>
       <p:ext uri="{BB962C8B-B14F-4D97-AF65-F5344CB8AC3E}">
-        <p14:creationId xmlns:p14="http://schemas.microsoft.com/office/powerpoint/2010/main" xmlns="" val="3587307284"/>
+        <p14:creationId xmlns:p14="http://schemas.microsoft.com/office/powerpoint/2010/main" val="3587307284"/>
       </p:ext>
     </p:extLst>
   </p:cSld>
@@ -19126,7 +22799,7 @@
     </p:spTree>
     <p:extLst>
       <p:ext uri="{BB962C8B-B14F-4D97-AF65-F5344CB8AC3E}">
-        <p14:creationId xmlns="" xmlns:p14="http://schemas.microsoft.com/office/powerpoint/2010/main" val="4006514606"/>
+        <p14:creationId xmlns:p14="http://schemas.microsoft.com/office/powerpoint/2010/main" val="4006514606"/>
       </p:ext>
     </p:extLst>
   </p:cSld>
@@ -20043,7 +23716,7 @@
             <a:blip r:embed="rId2" cstate="email">
               <a:extLst>
                 <a:ext uri="{28A0092B-C50C-407E-A947-70E740481C1C}">
-                  <a14:useLocalDpi xmlns:a14="http://schemas.microsoft.com/office/drawing/2010/main" xmlns="" val="0"/>
+                  <a14:useLocalDpi xmlns:a14="http://schemas.microsoft.com/office/drawing/2010/main" val="0"/>
                 </a:ext>
               </a:extLst>
             </a:blip>
@@ -20924,7 +24597,7 @@
     </p:spTree>
     <p:extLst>
       <p:ext uri="{BB962C8B-B14F-4D97-AF65-F5344CB8AC3E}">
-        <p14:creationId xmlns:p14="http://schemas.microsoft.com/office/powerpoint/2010/main" xmlns="" val="1180327365"/>
+        <p14:creationId xmlns:p14="http://schemas.microsoft.com/office/powerpoint/2010/main" val="1180327365"/>
       </p:ext>
     </p:extLst>
   </p:cSld>
@@ -28044,7 +31717,7 @@
     </p:spTree>
     <p:extLst>
       <p:ext uri="{BB962C8B-B14F-4D97-AF65-F5344CB8AC3E}">
-        <p14:creationId xmlns:p14="http://schemas.microsoft.com/office/powerpoint/2010/main" xmlns="" val="3114069629"/>
+        <p14:creationId xmlns:p14="http://schemas.microsoft.com/office/powerpoint/2010/main" val="3114069629"/>
       </p:ext>
     </p:extLst>
   </p:cSld>

</xml_diff>